<commit_message>
je deteste le cpp
</commit_message>
<xml_diff>
--- a/Presentation-Proj631 - Arbre_de_Décision.pptx
+++ b/Presentation-Proj631 - Arbre_de_Décision.pptx
@@ -119,14 +119,6 @@
     </p:ext>
   </p:extLst>
 </p:presentation>
-</file>
-
-<file path=ppt/revisionInfo.xml><?xml version="1.0" encoding="utf-8"?>
-<p1510:revInfo xmlns:a="http://schemas.openxmlformats.org/drawingml/2006/main" xmlns:r="http://schemas.openxmlformats.org/officeDocument/2006/relationships" xmlns:p1510="http://schemas.microsoft.com/office/powerpoint/2015/10/main">
-  <p1510:revLst>
-    <p1510:client id="{8C54CCA8-2B69-644F-8930-5EA0094D3E40}" v="12" dt="2024-04-02T07:17:37.451"/>
-  </p1510:revLst>
-</p1510:revInfo>
 </file>
 
 <file path=ppt/notesMasters/notesMaster1.xml><?xml version="1.0" encoding="utf-8"?>
@@ -3735,13 +3727,12 @@
             <a:avLst/>
           </a:prstGeom>
           <a:solidFill>
-            <a:schemeClr val="accent1">
-              <a:lumMod val="60000"/>
-              <a:lumOff val="40000"/>
-            </a:schemeClr>
+            <a:schemeClr val="accent6"/>
           </a:solidFill>
           <a:ln>
-            <a:noFill/>
+            <a:solidFill>
+              <a:schemeClr val="accent6"/>
+            </a:solidFill>
           </a:ln>
         </p:spPr>
         <p:style>
@@ -3799,7 +3790,7 @@
               <a:rPr lang="fr-FR" dirty="0">
                 <a:latin typeface="Avenir Book" panose="02000503020000020003" pitchFamily="2" charset="0"/>
               </a:rPr>
-              <a:t>Stockage de Données Personnelles</a:t>
+              <a:t>Arbre de Décision</a:t>
             </a:r>
           </a:p>
         </p:txBody>
@@ -4044,2647 +4035,6 @@
           </a:p>
         </p:txBody>
       </p:sp>
-      <p:grpSp>
-        <p:nvGrpSpPr>
-          <p:cNvPr id="1110" name="Group 1109">
-            <a:extLst>
-              <a:ext uri="{FF2B5EF4-FFF2-40B4-BE49-F238E27FC236}">
-                <a16:creationId xmlns:a16="http://schemas.microsoft.com/office/drawing/2014/main" id="{B7318EC1-4FC5-250B-CA12-1DC816BAE173}"/>
-              </a:ext>
-            </a:extLst>
-          </p:cNvPr>
-          <p:cNvGrpSpPr>
-            <a:grpSpLocks noChangeAspect="1"/>
-          </p:cNvGrpSpPr>
-          <p:nvPr/>
-        </p:nvGrpSpPr>
-        <p:grpSpPr>
-          <a:xfrm>
-            <a:off x="381612" y="1507498"/>
-            <a:ext cx="5390505" cy="3549260"/>
-            <a:chOff x="381612" y="1507498"/>
-            <a:chExt cx="5390505" cy="3549260"/>
-          </a:xfrm>
-        </p:grpSpPr>
-        <p:cxnSp>
-          <p:nvCxnSpPr>
-            <p:cNvPr id="1049" name="Straight Connector 1048">
-              <a:extLst>
-                <a:ext uri="{FF2B5EF4-FFF2-40B4-BE49-F238E27FC236}">
-                  <a16:creationId xmlns:a16="http://schemas.microsoft.com/office/drawing/2014/main" id="{ABE8F05A-C44D-24A3-A308-ADEDFA0F249B}"/>
-                </a:ext>
-              </a:extLst>
-            </p:cNvPr>
-            <p:cNvCxnSpPr>
-              <a:cxnSpLocks/>
-              <a:stCxn id="1066" idx="0"/>
-              <a:endCxn id="1094" idx="4"/>
-            </p:cNvCxnSpPr>
-            <p:nvPr/>
-          </p:nvCxnSpPr>
-          <p:spPr>
-            <a:xfrm flipH="1" flipV="1">
-              <a:off x="3739855" y="4114902"/>
-              <a:ext cx="17507" cy="276256"/>
-            </a:xfrm>
-            <a:prstGeom prst="line">
-              <a:avLst/>
-            </a:prstGeom>
-          </p:spPr>
-          <p:style>
-            <a:lnRef idx="2">
-              <a:schemeClr val="dk1"/>
-            </a:lnRef>
-            <a:fillRef idx="0">
-              <a:schemeClr val="dk1"/>
-            </a:fillRef>
-            <a:effectRef idx="1">
-              <a:schemeClr val="dk1"/>
-            </a:effectRef>
-            <a:fontRef idx="minor">
-              <a:schemeClr val="tx1"/>
-            </a:fontRef>
-          </p:style>
-        </p:cxnSp>
-        <p:grpSp>
-          <p:nvGrpSpPr>
-            <p:cNvPr id="1109" name="Group 1108">
-              <a:extLst>
-                <a:ext uri="{FF2B5EF4-FFF2-40B4-BE49-F238E27FC236}">
-                  <a16:creationId xmlns:a16="http://schemas.microsoft.com/office/drawing/2014/main" id="{AE9BEFED-4ED8-72D9-D278-D7562A9672F1}"/>
-                </a:ext>
-              </a:extLst>
-            </p:cNvPr>
-            <p:cNvGrpSpPr>
-              <a:grpSpLocks noChangeAspect="1"/>
-            </p:cNvGrpSpPr>
-            <p:nvPr/>
-          </p:nvGrpSpPr>
-          <p:grpSpPr>
-            <a:xfrm>
-              <a:off x="381612" y="1507498"/>
-              <a:ext cx="5390505" cy="3549260"/>
-              <a:chOff x="381612" y="1507498"/>
-              <a:chExt cx="5390505" cy="3549260"/>
-            </a:xfrm>
-          </p:grpSpPr>
-          <p:grpSp>
-            <p:nvGrpSpPr>
-              <p:cNvPr id="1036" name="Group 1035">
-                <a:extLst>
-                  <a:ext uri="{FF2B5EF4-FFF2-40B4-BE49-F238E27FC236}">
-                    <a16:creationId xmlns:a16="http://schemas.microsoft.com/office/drawing/2014/main" id="{8A9EE568-5222-C14D-5C87-D6D930507BA4}"/>
-                  </a:ext>
-                </a:extLst>
-              </p:cNvPr>
-              <p:cNvGrpSpPr/>
-              <p:nvPr/>
-            </p:nvGrpSpPr>
-            <p:grpSpPr>
-              <a:xfrm>
-                <a:off x="381612" y="2360507"/>
-                <a:ext cx="653138" cy="657814"/>
-                <a:chOff x="5223901" y="2189808"/>
-                <a:chExt cx="1404730" cy="1404730"/>
-              </a:xfrm>
-            </p:grpSpPr>
-            <p:sp>
-              <p:nvSpPr>
-                <p:cNvPr id="1104" name="Rectangle 1103">
-                  <a:extLst>
-                    <a:ext uri="{FF2B5EF4-FFF2-40B4-BE49-F238E27FC236}">
-                      <a16:creationId xmlns:a16="http://schemas.microsoft.com/office/drawing/2014/main" id="{C00987A3-8757-0FA6-C56D-7BDB3E93AB1E}"/>
-                    </a:ext>
-                  </a:extLst>
-                </p:cNvPr>
-                <p:cNvSpPr/>
-                <p:nvPr/>
-              </p:nvSpPr>
-              <p:spPr>
-                <a:xfrm>
-                  <a:off x="5223901" y="2189808"/>
-                  <a:ext cx="1404730" cy="1404730"/>
-                </a:xfrm>
-                <a:prstGeom prst="rect">
-                  <a:avLst/>
-                </a:prstGeom>
-                <a:ln w="12700">
-                  <a:solidFill>
-                    <a:schemeClr val="tx1"/>
-                  </a:solidFill>
-                </a:ln>
-              </p:spPr>
-              <p:style>
-                <a:lnRef idx="2">
-                  <a:schemeClr val="accent6"/>
-                </a:lnRef>
-                <a:fillRef idx="1">
-                  <a:schemeClr val="lt1"/>
-                </a:fillRef>
-                <a:effectRef idx="0">
-                  <a:schemeClr val="accent6"/>
-                </a:effectRef>
-                <a:fontRef idx="minor">
-                  <a:schemeClr val="dk1"/>
-                </a:fontRef>
-              </p:style>
-              <p:txBody>
-                <a:bodyPr rtlCol="0" anchor="ctr"/>
-                <a:lstStyle/>
-                <a:p>
-                  <a:pPr algn="ctr"/>
-                  <a:endParaRPr lang="fr-FR"/>
-                </a:p>
-              </p:txBody>
-            </p:sp>
-            <p:grpSp>
-              <p:nvGrpSpPr>
-                <p:cNvPr id="1105" name="Group 1104">
-                  <a:extLst>
-                    <a:ext uri="{FF2B5EF4-FFF2-40B4-BE49-F238E27FC236}">
-                      <a16:creationId xmlns:a16="http://schemas.microsoft.com/office/drawing/2014/main" id="{2CA5A5CD-59FD-1EB4-0517-A14F1C2EF09D}"/>
-                    </a:ext>
-                  </a:extLst>
-                </p:cNvPr>
-                <p:cNvGrpSpPr/>
-                <p:nvPr/>
-              </p:nvGrpSpPr>
-              <p:grpSpPr>
-                <a:xfrm>
-                  <a:off x="5451276" y="2391808"/>
-                  <a:ext cx="949980" cy="997778"/>
-                  <a:chOff x="4206340" y="524841"/>
-                  <a:chExt cx="949980" cy="997778"/>
-                </a:xfrm>
-              </p:grpSpPr>
-              <p:pic>
-                <p:nvPicPr>
-                  <p:cNvPr id="1106" name="Picture 2" descr="Apple IPhone X Revealed: Photos, Specs, Features, Release, 57% OFF">
-                    <a:extLst>
-                      <a:ext uri="{FF2B5EF4-FFF2-40B4-BE49-F238E27FC236}">
-                        <a16:creationId xmlns:a16="http://schemas.microsoft.com/office/drawing/2014/main" id="{345F49FC-1A6F-6898-955B-331C87898210}"/>
-                      </a:ext>
-                    </a:extLst>
-                  </p:cNvPr>
-                  <p:cNvPicPr>
-                    <a:picLocks noChangeAspect="1" noChangeArrowheads="1"/>
-                  </p:cNvPicPr>
-                  <p:nvPr/>
-                </p:nvPicPr>
-                <p:blipFill>
-                  <a:blip r:embed="rId2">
-                    <a:extLst>
-                      <a:ext uri="{28A0092B-C50C-407E-A947-70E740481C1C}">
-                        <a14:useLocalDpi xmlns:a14="http://schemas.microsoft.com/office/drawing/2010/main" val="0"/>
-                      </a:ext>
-                    </a:extLst>
-                  </a:blip>
-                  <a:srcRect/>
-                  <a:stretch>
-                    <a:fillRect/>
-                  </a:stretch>
-                </p:blipFill>
-                <p:spPr bwMode="auto">
-                  <a:xfrm>
-                    <a:off x="4206340" y="524841"/>
-                    <a:ext cx="949980" cy="997778"/>
-                  </a:xfrm>
-                  <a:prstGeom prst="rect">
-                    <a:avLst/>
-                  </a:prstGeom>
-                  <a:noFill/>
-                  <a:extLst>
-                    <a:ext uri="{909E8E84-426E-40DD-AFC4-6F175D3DCCD1}">
-                      <a14:hiddenFill xmlns:a14="http://schemas.microsoft.com/office/drawing/2010/main">
-                        <a:solidFill>
-                          <a:srgbClr val="FFFFFF"/>
-                        </a:solidFill>
-                      </a14:hiddenFill>
-                    </a:ext>
-                  </a:extLst>
-                </p:spPr>
-              </p:pic>
-              <p:pic>
-                <p:nvPicPr>
-                  <p:cNvPr id="1107" name="Picture 1106" descr="A white background with black dots&#10;&#10;Description automatically generated">
-                    <a:extLst>
-                      <a:ext uri="{FF2B5EF4-FFF2-40B4-BE49-F238E27FC236}">
-                        <a16:creationId xmlns:a16="http://schemas.microsoft.com/office/drawing/2014/main" id="{E6B5E55A-4D60-D485-267E-DAF8290BF274}"/>
-                      </a:ext>
-                    </a:extLst>
-                  </p:cNvPr>
-                  <p:cNvPicPr>
-                    <a:picLocks noChangeAspect="1"/>
-                  </p:cNvPicPr>
-                  <p:nvPr/>
-                </p:nvPicPr>
-                <p:blipFill>
-                  <a:blip r:embed="rId3"/>
-                  <a:stretch>
-                    <a:fillRect/>
-                  </a:stretch>
-                </p:blipFill>
-                <p:spPr>
-                  <a:xfrm>
-                    <a:off x="4511596" y="808411"/>
-                    <a:ext cx="292519" cy="314710"/>
-                  </a:xfrm>
-                  <a:prstGeom prst="rect">
-                    <a:avLst/>
-                  </a:prstGeom>
-                </p:spPr>
-              </p:pic>
-            </p:grpSp>
-          </p:grpSp>
-          <p:grpSp>
-            <p:nvGrpSpPr>
-              <p:cNvPr id="1038" name="Group 1037">
-                <a:extLst>
-                  <a:ext uri="{FF2B5EF4-FFF2-40B4-BE49-F238E27FC236}">
-                    <a16:creationId xmlns:a16="http://schemas.microsoft.com/office/drawing/2014/main" id="{D4E336B0-767B-EE70-FA80-8906D1C553E4}"/>
-                  </a:ext>
-                </a:extLst>
-              </p:cNvPr>
-              <p:cNvGrpSpPr/>
-              <p:nvPr/>
-            </p:nvGrpSpPr>
-            <p:grpSpPr>
-              <a:xfrm>
-                <a:off x="1129886" y="1507498"/>
-                <a:ext cx="653138" cy="657814"/>
-                <a:chOff x="5223901" y="2189808"/>
-                <a:chExt cx="1404730" cy="1404730"/>
-              </a:xfrm>
-            </p:grpSpPr>
-            <p:sp>
-              <p:nvSpPr>
-                <p:cNvPr id="1100" name="Rectangle 1099">
-                  <a:extLst>
-                    <a:ext uri="{FF2B5EF4-FFF2-40B4-BE49-F238E27FC236}">
-                      <a16:creationId xmlns:a16="http://schemas.microsoft.com/office/drawing/2014/main" id="{F1DFC180-1DF1-1EE1-382B-991D4F810D07}"/>
-                    </a:ext>
-                  </a:extLst>
-                </p:cNvPr>
-                <p:cNvSpPr/>
-                <p:nvPr/>
-              </p:nvSpPr>
-              <p:spPr>
-                <a:xfrm>
-                  <a:off x="5223901" y="2189808"/>
-                  <a:ext cx="1404730" cy="1404730"/>
-                </a:xfrm>
-                <a:prstGeom prst="rect">
-                  <a:avLst/>
-                </a:prstGeom>
-                <a:ln w="12700">
-                  <a:solidFill>
-                    <a:schemeClr val="tx1"/>
-                  </a:solidFill>
-                </a:ln>
-              </p:spPr>
-              <p:style>
-                <a:lnRef idx="2">
-                  <a:schemeClr val="accent6"/>
-                </a:lnRef>
-                <a:fillRef idx="1">
-                  <a:schemeClr val="lt1"/>
-                </a:fillRef>
-                <a:effectRef idx="0">
-                  <a:schemeClr val="accent6"/>
-                </a:effectRef>
-                <a:fontRef idx="minor">
-                  <a:schemeClr val="dk1"/>
-                </a:fontRef>
-              </p:style>
-              <p:txBody>
-                <a:bodyPr rtlCol="0" anchor="ctr"/>
-                <a:lstStyle/>
-                <a:p>
-                  <a:pPr algn="ctr"/>
-                  <a:endParaRPr lang="fr-FR"/>
-                </a:p>
-              </p:txBody>
-            </p:sp>
-            <p:grpSp>
-              <p:nvGrpSpPr>
-                <p:cNvPr id="1101" name="Group 1100">
-                  <a:extLst>
-                    <a:ext uri="{FF2B5EF4-FFF2-40B4-BE49-F238E27FC236}">
-                      <a16:creationId xmlns:a16="http://schemas.microsoft.com/office/drawing/2014/main" id="{5F4102BD-8216-C322-E11E-30AD0916E713}"/>
-                    </a:ext>
-                  </a:extLst>
-                </p:cNvPr>
-                <p:cNvGrpSpPr/>
-                <p:nvPr/>
-              </p:nvGrpSpPr>
-              <p:grpSpPr>
-                <a:xfrm>
-                  <a:off x="5451276" y="2391808"/>
-                  <a:ext cx="949980" cy="997778"/>
-                  <a:chOff x="4206340" y="524841"/>
-                  <a:chExt cx="949980" cy="997778"/>
-                </a:xfrm>
-              </p:grpSpPr>
-              <p:pic>
-                <p:nvPicPr>
-                  <p:cNvPr id="1102" name="Picture 2" descr="Apple IPhone X Revealed: Photos, Specs, Features, Release, 57% OFF">
-                    <a:extLst>
-                      <a:ext uri="{FF2B5EF4-FFF2-40B4-BE49-F238E27FC236}">
-                        <a16:creationId xmlns:a16="http://schemas.microsoft.com/office/drawing/2014/main" id="{129DDAF5-5B3F-6929-3311-BF1484E4D0A1}"/>
-                      </a:ext>
-                    </a:extLst>
-                  </p:cNvPr>
-                  <p:cNvPicPr>
-                    <a:picLocks noChangeAspect="1" noChangeArrowheads="1"/>
-                  </p:cNvPicPr>
-                  <p:nvPr/>
-                </p:nvPicPr>
-                <p:blipFill>
-                  <a:blip r:embed="rId2">
-                    <a:extLst>
-                      <a:ext uri="{28A0092B-C50C-407E-A947-70E740481C1C}">
-                        <a14:useLocalDpi xmlns:a14="http://schemas.microsoft.com/office/drawing/2010/main" val="0"/>
-                      </a:ext>
-                    </a:extLst>
-                  </a:blip>
-                  <a:srcRect/>
-                  <a:stretch>
-                    <a:fillRect/>
-                  </a:stretch>
-                </p:blipFill>
-                <p:spPr bwMode="auto">
-                  <a:xfrm>
-                    <a:off x="4206340" y="524841"/>
-                    <a:ext cx="949980" cy="997778"/>
-                  </a:xfrm>
-                  <a:prstGeom prst="rect">
-                    <a:avLst/>
-                  </a:prstGeom>
-                  <a:noFill/>
-                  <a:extLst>
-                    <a:ext uri="{909E8E84-426E-40DD-AFC4-6F175D3DCCD1}">
-                      <a14:hiddenFill xmlns:a14="http://schemas.microsoft.com/office/drawing/2010/main">
-                        <a:solidFill>
-                          <a:srgbClr val="FFFFFF"/>
-                        </a:solidFill>
-                      </a14:hiddenFill>
-                    </a:ext>
-                  </a:extLst>
-                </p:spPr>
-              </p:pic>
-              <p:pic>
-                <p:nvPicPr>
-                  <p:cNvPr id="1103" name="Picture 1102" descr="A white background with black dots&#10;&#10;Description automatically generated">
-                    <a:extLst>
-                      <a:ext uri="{FF2B5EF4-FFF2-40B4-BE49-F238E27FC236}">
-                        <a16:creationId xmlns:a16="http://schemas.microsoft.com/office/drawing/2014/main" id="{BB34A29C-2DEF-047F-FE66-555F03F4A530}"/>
-                      </a:ext>
-                    </a:extLst>
-                  </p:cNvPr>
-                  <p:cNvPicPr>
-                    <a:picLocks noChangeAspect="1"/>
-                  </p:cNvPicPr>
-                  <p:nvPr/>
-                </p:nvPicPr>
-                <p:blipFill>
-                  <a:blip r:embed="rId3"/>
-                  <a:stretch>
-                    <a:fillRect/>
-                  </a:stretch>
-                </p:blipFill>
-                <p:spPr>
-                  <a:xfrm>
-                    <a:off x="4511596" y="808411"/>
-                    <a:ext cx="292519" cy="314710"/>
-                  </a:xfrm>
-                  <a:prstGeom prst="rect">
-                    <a:avLst/>
-                  </a:prstGeom>
-                </p:spPr>
-              </p:pic>
-            </p:grpSp>
-          </p:grpSp>
-          <p:grpSp>
-            <p:nvGrpSpPr>
-              <p:cNvPr id="1041" name="Group 1040">
-                <a:extLst>
-                  <a:ext uri="{FF2B5EF4-FFF2-40B4-BE49-F238E27FC236}">
-                    <a16:creationId xmlns:a16="http://schemas.microsoft.com/office/drawing/2014/main" id="{38C85D55-65C2-5DC5-4620-B06BC44E1EA1}"/>
-                  </a:ext>
-                </a:extLst>
-              </p:cNvPr>
-              <p:cNvGrpSpPr/>
-              <p:nvPr/>
-            </p:nvGrpSpPr>
-            <p:grpSpPr>
-              <a:xfrm>
-                <a:off x="2104750" y="1895927"/>
-                <a:ext cx="2287016" cy="2221167"/>
-                <a:chOff x="4430906" y="875054"/>
-                <a:chExt cx="4658196" cy="4439216"/>
-              </a:xfrm>
-            </p:grpSpPr>
-            <p:cxnSp>
-              <p:nvCxnSpPr>
-                <p:cNvPr id="1074" name="Straight Connector 1073">
-                  <a:extLst>
-                    <a:ext uri="{FF2B5EF4-FFF2-40B4-BE49-F238E27FC236}">
-                      <a16:creationId xmlns:a16="http://schemas.microsoft.com/office/drawing/2014/main" id="{FF5C5CD8-814E-2ACA-EEE6-4D4863D14362}"/>
-                    </a:ext>
-                  </a:extLst>
-                </p:cNvPr>
-                <p:cNvCxnSpPr>
-                  <a:cxnSpLocks/>
-                  <a:endCxn id="1092" idx="0"/>
-                </p:cNvCxnSpPr>
-                <p:nvPr/>
-              </p:nvCxnSpPr>
-              <p:spPr>
-                <a:xfrm flipH="1">
-                  <a:off x="5761218" y="2132395"/>
-                  <a:ext cx="758852" cy="1867170"/>
-                </a:xfrm>
-                <a:prstGeom prst="line">
-                  <a:avLst/>
-                </a:prstGeom>
-                <a:ln>
-                  <a:solidFill>
-                    <a:schemeClr val="tx1"/>
-                  </a:solidFill>
-                </a:ln>
-              </p:spPr>
-              <p:style>
-                <a:lnRef idx="2">
-                  <a:schemeClr val="dk1"/>
-                </a:lnRef>
-                <a:fillRef idx="0">
-                  <a:schemeClr val="dk1"/>
-                </a:fillRef>
-                <a:effectRef idx="1">
-                  <a:schemeClr val="dk1"/>
-                </a:effectRef>
-                <a:fontRef idx="minor">
-                  <a:schemeClr val="tx1"/>
-                </a:fontRef>
-              </p:style>
-            </p:cxnSp>
-            <p:grpSp>
-              <p:nvGrpSpPr>
-                <p:cNvPr id="1075" name="Group 1074">
-                  <a:extLst>
-                    <a:ext uri="{FF2B5EF4-FFF2-40B4-BE49-F238E27FC236}">
-                      <a16:creationId xmlns:a16="http://schemas.microsoft.com/office/drawing/2014/main" id="{5F68DAC1-804E-23DE-3156-FD622718FD43}"/>
-                    </a:ext>
-                  </a:extLst>
-                </p:cNvPr>
-                <p:cNvGrpSpPr/>
-                <p:nvPr/>
-              </p:nvGrpSpPr>
-              <p:grpSpPr>
-                <a:xfrm>
-                  <a:off x="4430906" y="875054"/>
-                  <a:ext cx="4658196" cy="4439216"/>
-                  <a:chOff x="4430906" y="875054"/>
-                  <a:chExt cx="4658196" cy="4439216"/>
-                </a:xfrm>
-              </p:grpSpPr>
-              <p:grpSp>
-                <p:nvGrpSpPr>
-                  <p:cNvPr id="1076" name="Group 1075">
-                    <a:extLst>
-                      <a:ext uri="{FF2B5EF4-FFF2-40B4-BE49-F238E27FC236}">
-                        <a16:creationId xmlns:a16="http://schemas.microsoft.com/office/drawing/2014/main" id="{D8D2C705-7735-71F3-EEFF-8ACB1A8C8687}"/>
-                      </a:ext>
-                    </a:extLst>
-                  </p:cNvPr>
-                  <p:cNvGrpSpPr/>
-                  <p:nvPr/>
-                </p:nvGrpSpPr>
-                <p:grpSpPr>
-                  <a:xfrm>
-                    <a:off x="4430906" y="2201082"/>
-                    <a:ext cx="1330312" cy="1314705"/>
-                    <a:chOff x="2203173" y="2481469"/>
-                    <a:chExt cx="1404730" cy="1404730"/>
-                  </a:xfrm>
-                </p:grpSpPr>
-                <p:sp>
-                  <p:nvSpPr>
-                    <p:cNvPr id="1098" name="Oval 1097">
-                      <a:extLst>
-                        <a:ext uri="{FF2B5EF4-FFF2-40B4-BE49-F238E27FC236}">
-                          <a16:creationId xmlns:a16="http://schemas.microsoft.com/office/drawing/2014/main" id="{4EB1F0AE-3D2B-ED07-7031-033930A331D9}"/>
-                        </a:ext>
-                      </a:extLst>
-                    </p:cNvPr>
-                    <p:cNvSpPr/>
-                    <p:nvPr/>
-                  </p:nvSpPr>
-                  <p:spPr>
-                    <a:xfrm>
-                      <a:off x="2203173" y="2481469"/>
-                      <a:ext cx="1404730" cy="1404730"/>
-                    </a:xfrm>
-                    <a:prstGeom prst="ellipse">
-                      <a:avLst/>
-                    </a:prstGeom>
-                    <a:solidFill>
-                      <a:schemeClr val="bg1"/>
-                    </a:solidFill>
-                    <a:ln w="12700">
-                      <a:solidFill>
-                        <a:schemeClr val="tx1"/>
-                      </a:solidFill>
-                    </a:ln>
-                  </p:spPr>
-                  <p:style>
-                    <a:lnRef idx="0">
-                      <a:scrgbClr r="0" g="0" b="0"/>
-                    </a:lnRef>
-                    <a:fillRef idx="0">
-                      <a:scrgbClr r="0" g="0" b="0"/>
-                    </a:fillRef>
-                    <a:effectRef idx="0">
-                      <a:scrgbClr r="0" g="0" b="0"/>
-                    </a:effectRef>
-                    <a:fontRef idx="minor">
-                      <a:schemeClr val="lt1"/>
-                    </a:fontRef>
-                  </p:style>
-                  <p:txBody>
-                    <a:bodyPr rtlCol="0" anchor="ctr"/>
-                    <a:lstStyle/>
-                    <a:p>
-                      <a:pPr algn="ctr"/>
-                      <a:endParaRPr lang="fr-FR">
-                        <a:ln w="0"/>
-                        <a:solidFill>
-                          <a:schemeClr val="tx1"/>
-                        </a:solidFill>
-                        <a:effectLst>
-                          <a:outerShdw blurRad="38100" dist="19050" dir="2700000" algn="tl" rotWithShape="0">
-                            <a:schemeClr val="dk1">
-                              <a:alpha val="40000"/>
-                            </a:schemeClr>
-                          </a:outerShdw>
-                        </a:effectLst>
-                      </a:endParaRPr>
-                    </a:p>
-                  </p:txBody>
-                </p:sp>
-                <p:pic>
-                  <p:nvPicPr>
-                    <p:cNvPr id="1099" name="Picture 6" descr="Serveur Vectorielle PNG , Serveur, Lien, Connecter PNG et vecteur pour  téléchargement gratuit">
-                      <a:extLst>
-                        <a:ext uri="{FF2B5EF4-FFF2-40B4-BE49-F238E27FC236}">
-                          <a16:creationId xmlns:a16="http://schemas.microsoft.com/office/drawing/2014/main" id="{245BEBB5-99E7-5297-DC5C-928A691A8533}"/>
-                        </a:ext>
-                      </a:extLst>
-                    </p:cNvPr>
-                    <p:cNvPicPr>
-                      <a:picLocks noChangeAspect="1" noChangeArrowheads="1"/>
-                    </p:cNvPicPr>
-                    <p:nvPr/>
-                  </p:nvPicPr>
-                  <p:blipFill rotWithShape="1">
-                    <a:blip r:embed="rId4">
-                      <a:extLst>
-                        <a:ext uri="{28A0092B-C50C-407E-A947-70E740481C1C}">
-                          <a14:useLocalDpi xmlns:a14="http://schemas.microsoft.com/office/drawing/2010/main" val="0"/>
-                        </a:ext>
-                      </a:extLst>
-                    </a:blip>
-                    <a:srcRect l="16245" t="10518" r="16227" b="10227"/>
-                    <a:stretch/>
-                  </p:blipFill>
-                  <p:spPr bwMode="auto">
-                    <a:xfrm>
-                      <a:off x="2551411" y="2763773"/>
-                      <a:ext cx="707844" cy="830765"/>
-                    </a:xfrm>
-                    <a:prstGeom prst="rect">
-                      <a:avLst/>
-                    </a:prstGeom>
-                    <a:noFill/>
-                    <a:extLst>
-                      <a:ext uri="{909E8E84-426E-40DD-AFC4-6F175D3DCCD1}">
-                        <a14:hiddenFill xmlns:a14="http://schemas.microsoft.com/office/drawing/2010/main">
-                          <a:solidFill>
-                            <a:srgbClr val="FFFFFF"/>
-                          </a:solidFill>
-                        </a14:hiddenFill>
-                      </a:ext>
-                    </a:extLst>
-                  </p:spPr>
-                </p:pic>
-              </p:grpSp>
-              <p:grpSp>
-                <p:nvGrpSpPr>
-                  <p:cNvPr id="1077" name="Group 1076">
-                    <a:extLst>
-                      <a:ext uri="{FF2B5EF4-FFF2-40B4-BE49-F238E27FC236}">
-                        <a16:creationId xmlns:a16="http://schemas.microsoft.com/office/drawing/2014/main" id="{B05CD106-A7C2-4821-60C2-67FDB01D10FB}"/>
-                      </a:ext>
-                    </a:extLst>
-                  </p:cNvPr>
-                  <p:cNvGrpSpPr/>
-                  <p:nvPr/>
-                </p:nvGrpSpPr>
-                <p:grpSpPr>
-                  <a:xfrm>
-                    <a:off x="6128309" y="875054"/>
-                    <a:ext cx="1330312" cy="1314705"/>
-                    <a:chOff x="2203173" y="2481469"/>
-                    <a:chExt cx="1404730" cy="1404730"/>
-                  </a:xfrm>
-                </p:grpSpPr>
-                <p:sp>
-                  <p:nvSpPr>
-                    <p:cNvPr id="1096" name="Oval 1095">
-                      <a:extLst>
-                        <a:ext uri="{FF2B5EF4-FFF2-40B4-BE49-F238E27FC236}">
-                          <a16:creationId xmlns:a16="http://schemas.microsoft.com/office/drawing/2014/main" id="{9FC0A0F8-C201-0AC4-B9F9-DE47C5EDC42C}"/>
-                        </a:ext>
-                      </a:extLst>
-                    </p:cNvPr>
-                    <p:cNvSpPr/>
-                    <p:nvPr/>
-                  </p:nvSpPr>
-                  <p:spPr>
-                    <a:xfrm>
-                      <a:off x="2203173" y="2481469"/>
-                      <a:ext cx="1404730" cy="1404730"/>
-                    </a:xfrm>
-                    <a:prstGeom prst="ellipse">
-                      <a:avLst/>
-                    </a:prstGeom>
-                    <a:solidFill>
-                      <a:schemeClr val="bg1"/>
-                    </a:solidFill>
-                    <a:ln w="12700">
-                      <a:solidFill>
-                        <a:schemeClr val="tx1"/>
-                      </a:solidFill>
-                    </a:ln>
-                  </p:spPr>
-                  <p:style>
-                    <a:lnRef idx="0">
-                      <a:scrgbClr r="0" g="0" b="0"/>
-                    </a:lnRef>
-                    <a:fillRef idx="0">
-                      <a:scrgbClr r="0" g="0" b="0"/>
-                    </a:fillRef>
-                    <a:effectRef idx="0">
-                      <a:scrgbClr r="0" g="0" b="0"/>
-                    </a:effectRef>
-                    <a:fontRef idx="minor">
-                      <a:schemeClr val="lt1"/>
-                    </a:fontRef>
-                  </p:style>
-                  <p:txBody>
-                    <a:bodyPr rtlCol="0" anchor="ctr"/>
-                    <a:lstStyle/>
-                    <a:p>
-                      <a:pPr algn="ctr"/>
-                      <a:endParaRPr lang="fr-FR">
-                        <a:ln w="0"/>
-                        <a:solidFill>
-                          <a:schemeClr val="tx1"/>
-                        </a:solidFill>
-                        <a:effectLst>
-                          <a:outerShdw blurRad="38100" dist="19050" dir="2700000" algn="tl" rotWithShape="0">
-                            <a:schemeClr val="dk1">
-                              <a:alpha val="40000"/>
-                            </a:schemeClr>
-                          </a:outerShdw>
-                        </a:effectLst>
-                      </a:endParaRPr>
-                    </a:p>
-                  </p:txBody>
-                </p:sp>
-                <p:pic>
-                  <p:nvPicPr>
-                    <p:cNvPr id="1097" name="Picture 6" descr="Serveur Vectorielle PNG , Serveur, Lien, Connecter PNG et vecteur pour  téléchargement gratuit">
-                      <a:extLst>
-                        <a:ext uri="{FF2B5EF4-FFF2-40B4-BE49-F238E27FC236}">
-                          <a16:creationId xmlns:a16="http://schemas.microsoft.com/office/drawing/2014/main" id="{C249A2C5-6E37-53C9-7F3F-0D4934D9C0D7}"/>
-                        </a:ext>
-                      </a:extLst>
-                    </p:cNvPr>
-                    <p:cNvPicPr>
-                      <a:picLocks noChangeAspect="1" noChangeArrowheads="1"/>
-                    </p:cNvPicPr>
-                    <p:nvPr/>
-                  </p:nvPicPr>
-                  <p:blipFill rotWithShape="1">
-                    <a:blip r:embed="rId4">
-                      <a:extLst>
-                        <a:ext uri="{28A0092B-C50C-407E-A947-70E740481C1C}">
-                          <a14:useLocalDpi xmlns:a14="http://schemas.microsoft.com/office/drawing/2010/main" val="0"/>
-                        </a:ext>
-                      </a:extLst>
-                    </a:blip>
-                    <a:srcRect l="16245" t="10518" r="16227" b="10227"/>
-                    <a:stretch/>
-                  </p:blipFill>
-                  <p:spPr bwMode="auto">
-                    <a:xfrm>
-                      <a:off x="2551411" y="2763773"/>
-                      <a:ext cx="707844" cy="830765"/>
-                    </a:xfrm>
-                    <a:prstGeom prst="rect">
-                      <a:avLst/>
-                    </a:prstGeom>
-                    <a:noFill/>
-                    <a:extLst>
-                      <a:ext uri="{909E8E84-426E-40DD-AFC4-6F175D3DCCD1}">
-                        <a14:hiddenFill xmlns:a14="http://schemas.microsoft.com/office/drawing/2010/main">
-                          <a:solidFill>
-                            <a:srgbClr val="FFFFFF"/>
-                          </a:solidFill>
-                        </a14:hiddenFill>
-                      </a:ext>
-                    </a:extLst>
-                  </p:spPr>
-                </p:pic>
-              </p:grpSp>
-              <p:grpSp>
-                <p:nvGrpSpPr>
-                  <p:cNvPr id="1078" name="Group 1077">
-                    <a:extLst>
-                      <a:ext uri="{FF2B5EF4-FFF2-40B4-BE49-F238E27FC236}">
-                        <a16:creationId xmlns:a16="http://schemas.microsoft.com/office/drawing/2014/main" id="{9F07CC6B-B190-DD1F-FAC9-28CEEBBFC74C}"/>
-                      </a:ext>
-                    </a:extLst>
-                  </p:cNvPr>
-                  <p:cNvGrpSpPr/>
-                  <p:nvPr/>
-                </p:nvGrpSpPr>
-                <p:grpSpPr>
-                  <a:xfrm>
-                    <a:off x="7096134" y="3995186"/>
-                    <a:ext cx="1330312" cy="1314705"/>
-                    <a:chOff x="2203173" y="2481469"/>
-                    <a:chExt cx="1404730" cy="1404730"/>
-                  </a:xfrm>
-                </p:grpSpPr>
-                <p:sp>
-                  <p:nvSpPr>
-                    <p:cNvPr id="1094" name="Oval 1093">
-                      <a:extLst>
-                        <a:ext uri="{FF2B5EF4-FFF2-40B4-BE49-F238E27FC236}">
-                          <a16:creationId xmlns:a16="http://schemas.microsoft.com/office/drawing/2014/main" id="{BF78495B-FB83-BF59-BA54-D5ADE3700A37}"/>
-                        </a:ext>
-                      </a:extLst>
-                    </p:cNvPr>
-                    <p:cNvSpPr/>
-                    <p:nvPr/>
-                  </p:nvSpPr>
-                  <p:spPr>
-                    <a:xfrm>
-                      <a:off x="2203173" y="2481469"/>
-                      <a:ext cx="1404730" cy="1404730"/>
-                    </a:xfrm>
-                    <a:prstGeom prst="ellipse">
-                      <a:avLst/>
-                    </a:prstGeom>
-                    <a:solidFill>
-                      <a:schemeClr val="bg1"/>
-                    </a:solidFill>
-                    <a:ln w="12700">
-                      <a:solidFill>
-                        <a:schemeClr val="tx1"/>
-                      </a:solidFill>
-                    </a:ln>
-                  </p:spPr>
-                  <p:style>
-                    <a:lnRef idx="0">
-                      <a:scrgbClr r="0" g="0" b="0"/>
-                    </a:lnRef>
-                    <a:fillRef idx="0">
-                      <a:scrgbClr r="0" g="0" b="0"/>
-                    </a:fillRef>
-                    <a:effectRef idx="0">
-                      <a:scrgbClr r="0" g="0" b="0"/>
-                    </a:effectRef>
-                    <a:fontRef idx="minor">
-                      <a:schemeClr val="lt1"/>
-                    </a:fontRef>
-                  </p:style>
-                  <p:txBody>
-                    <a:bodyPr rtlCol="0" anchor="ctr"/>
-                    <a:lstStyle/>
-                    <a:p>
-                      <a:pPr algn="ctr"/>
-                      <a:endParaRPr lang="fr-FR">
-                        <a:ln w="0"/>
-                        <a:solidFill>
-                          <a:schemeClr val="tx1"/>
-                        </a:solidFill>
-                        <a:effectLst>
-                          <a:outerShdw blurRad="38100" dist="19050" dir="2700000" algn="tl" rotWithShape="0">
-                            <a:schemeClr val="dk1">
-                              <a:alpha val="40000"/>
-                            </a:schemeClr>
-                          </a:outerShdw>
-                        </a:effectLst>
-                      </a:endParaRPr>
-                    </a:p>
-                  </p:txBody>
-                </p:sp>
-                <p:pic>
-                  <p:nvPicPr>
-                    <p:cNvPr id="1095" name="Picture 6" descr="Serveur Vectorielle PNG , Serveur, Lien, Connecter PNG et vecteur pour  téléchargement gratuit">
-                      <a:extLst>
-                        <a:ext uri="{FF2B5EF4-FFF2-40B4-BE49-F238E27FC236}">
-                          <a16:creationId xmlns:a16="http://schemas.microsoft.com/office/drawing/2014/main" id="{6D5EDD88-36B8-61D9-51B9-CF240176D7E6}"/>
-                        </a:ext>
-                      </a:extLst>
-                    </p:cNvPr>
-                    <p:cNvPicPr>
-                      <a:picLocks noChangeAspect="1" noChangeArrowheads="1"/>
-                    </p:cNvPicPr>
-                    <p:nvPr/>
-                  </p:nvPicPr>
-                  <p:blipFill rotWithShape="1">
-                    <a:blip r:embed="rId4">
-                      <a:extLst>
-                        <a:ext uri="{28A0092B-C50C-407E-A947-70E740481C1C}">
-                          <a14:useLocalDpi xmlns:a14="http://schemas.microsoft.com/office/drawing/2010/main" val="0"/>
-                        </a:ext>
-                      </a:extLst>
-                    </a:blip>
-                    <a:srcRect l="16245" t="10518" r="16227" b="10227"/>
-                    <a:stretch/>
-                  </p:blipFill>
-                  <p:spPr bwMode="auto">
-                    <a:xfrm>
-                      <a:off x="2551411" y="2763773"/>
-                      <a:ext cx="707844" cy="830765"/>
-                    </a:xfrm>
-                    <a:prstGeom prst="rect">
-                      <a:avLst/>
-                    </a:prstGeom>
-                    <a:noFill/>
-                    <a:extLst>
-                      <a:ext uri="{909E8E84-426E-40DD-AFC4-6F175D3DCCD1}">
-                        <a14:hiddenFill xmlns:a14="http://schemas.microsoft.com/office/drawing/2010/main">
-                          <a:solidFill>
-                            <a:srgbClr val="FFFFFF"/>
-                          </a:solidFill>
-                        </a14:hiddenFill>
-                      </a:ext>
-                    </a:extLst>
-                  </p:spPr>
-                </p:pic>
-              </p:grpSp>
-              <p:grpSp>
-                <p:nvGrpSpPr>
-                  <p:cNvPr id="1079" name="Group 1078">
-                    <a:extLst>
-                      <a:ext uri="{FF2B5EF4-FFF2-40B4-BE49-F238E27FC236}">
-                        <a16:creationId xmlns:a16="http://schemas.microsoft.com/office/drawing/2014/main" id="{39E18B53-19F2-9764-D42D-988F829ACE84}"/>
-                      </a:ext>
-                    </a:extLst>
-                  </p:cNvPr>
-                  <p:cNvGrpSpPr/>
-                  <p:nvPr/>
-                </p:nvGrpSpPr>
-                <p:grpSpPr>
-                  <a:xfrm>
-                    <a:off x="5096062" y="3999565"/>
-                    <a:ext cx="1330312" cy="1314705"/>
-                    <a:chOff x="2203173" y="2481469"/>
-                    <a:chExt cx="1404730" cy="1404730"/>
-                  </a:xfrm>
-                </p:grpSpPr>
-                <p:sp>
-                  <p:nvSpPr>
-                    <p:cNvPr id="1092" name="Oval 1091">
-                      <a:extLst>
-                        <a:ext uri="{FF2B5EF4-FFF2-40B4-BE49-F238E27FC236}">
-                          <a16:creationId xmlns:a16="http://schemas.microsoft.com/office/drawing/2014/main" id="{C31F0F54-7CF3-CF59-53F6-FCFBB5E61896}"/>
-                        </a:ext>
-                      </a:extLst>
-                    </p:cNvPr>
-                    <p:cNvSpPr/>
-                    <p:nvPr/>
-                  </p:nvSpPr>
-                  <p:spPr>
-                    <a:xfrm>
-                      <a:off x="2203173" y="2481469"/>
-                      <a:ext cx="1404730" cy="1404730"/>
-                    </a:xfrm>
-                    <a:prstGeom prst="ellipse">
-                      <a:avLst/>
-                    </a:prstGeom>
-                    <a:solidFill>
-                      <a:schemeClr val="bg1"/>
-                    </a:solidFill>
-                    <a:ln w="12700">
-                      <a:solidFill>
-                        <a:schemeClr val="tx1"/>
-                      </a:solidFill>
-                    </a:ln>
-                  </p:spPr>
-                  <p:style>
-                    <a:lnRef idx="0">
-                      <a:scrgbClr r="0" g="0" b="0"/>
-                    </a:lnRef>
-                    <a:fillRef idx="0">
-                      <a:scrgbClr r="0" g="0" b="0"/>
-                    </a:fillRef>
-                    <a:effectRef idx="0">
-                      <a:scrgbClr r="0" g="0" b="0"/>
-                    </a:effectRef>
-                    <a:fontRef idx="minor">
-                      <a:schemeClr val="lt1"/>
-                    </a:fontRef>
-                  </p:style>
-                  <p:txBody>
-                    <a:bodyPr rtlCol="0" anchor="ctr"/>
-                    <a:lstStyle/>
-                    <a:p>
-                      <a:pPr algn="ctr"/>
-                      <a:endParaRPr lang="fr-FR">
-                        <a:ln w="0"/>
-                        <a:solidFill>
-                          <a:schemeClr val="tx1"/>
-                        </a:solidFill>
-                        <a:effectLst>
-                          <a:outerShdw blurRad="38100" dist="19050" dir="2700000" algn="tl" rotWithShape="0">
-                            <a:schemeClr val="dk1">
-                              <a:alpha val="40000"/>
-                            </a:schemeClr>
-                          </a:outerShdw>
-                        </a:effectLst>
-                      </a:endParaRPr>
-                    </a:p>
-                  </p:txBody>
-                </p:sp>
-                <p:pic>
-                  <p:nvPicPr>
-                    <p:cNvPr id="1093" name="Picture 6" descr="Serveur Vectorielle PNG , Serveur, Lien, Connecter PNG et vecteur pour  téléchargement gratuit">
-                      <a:extLst>
-                        <a:ext uri="{FF2B5EF4-FFF2-40B4-BE49-F238E27FC236}">
-                          <a16:creationId xmlns:a16="http://schemas.microsoft.com/office/drawing/2014/main" id="{2E4C0B62-E27B-06E0-E5B0-73E15D95AD53}"/>
-                        </a:ext>
-                      </a:extLst>
-                    </p:cNvPr>
-                    <p:cNvPicPr>
-                      <a:picLocks noChangeAspect="1" noChangeArrowheads="1"/>
-                    </p:cNvPicPr>
-                    <p:nvPr/>
-                  </p:nvPicPr>
-                  <p:blipFill rotWithShape="1">
-                    <a:blip r:embed="rId4">
-                      <a:extLst>
-                        <a:ext uri="{28A0092B-C50C-407E-A947-70E740481C1C}">
-                          <a14:useLocalDpi xmlns:a14="http://schemas.microsoft.com/office/drawing/2010/main" val="0"/>
-                        </a:ext>
-                      </a:extLst>
-                    </a:blip>
-                    <a:srcRect l="16245" t="10518" r="16227" b="10227"/>
-                    <a:stretch/>
-                  </p:blipFill>
-                  <p:spPr bwMode="auto">
-                    <a:xfrm>
-                      <a:off x="2551411" y="2763773"/>
-                      <a:ext cx="707844" cy="830765"/>
-                    </a:xfrm>
-                    <a:prstGeom prst="rect">
-                      <a:avLst/>
-                    </a:prstGeom>
-                    <a:noFill/>
-                    <a:extLst>
-                      <a:ext uri="{909E8E84-426E-40DD-AFC4-6F175D3DCCD1}">
-                        <a14:hiddenFill xmlns:a14="http://schemas.microsoft.com/office/drawing/2010/main">
-                          <a:solidFill>
-                            <a:srgbClr val="FFFFFF"/>
-                          </a:solidFill>
-                        </a14:hiddenFill>
-                      </a:ext>
-                    </a:extLst>
-                  </p:spPr>
-                </p:pic>
-              </p:grpSp>
-              <p:grpSp>
-                <p:nvGrpSpPr>
-                  <p:cNvPr id="1080" name="Group 1079">
-                    <a:extLst>
-                      <a:ext uri="{FF2B5EF4-FFF2-40B4-BE49-F238E27FC236}">
-                        <a16:creationId xmlns:a16="http://schemas.microsoft.com/office/drawing/2014/main" id="{7235598A-01A2-F53B-846E-05A2F7DA4B42}"/>
-                      </a:ext>
-                    </a:extLst>
-                  </p:cNvPr>
-                  <p:cNvGrpSpPr/>
-                  <p:nvPr/>
-                </p:nvGrpSpPr>
-                <p:grpSpPr>
-                  <a:xfrm>
-                    <a:off x="7758790" y="2196703"/>
-                    <a:ext cx="1330312" cy="1314705"/>
-                    <a:chOff x="2203173" y="2481469"/>
-                    <a:chExt cx="1404730" cy="1404730"/>
-                  </a:xfrm>
-                </p:grpSpPr>
-                <p:sp>
-                  <p:nvSpPr>
-                    <p:cNvPr id="1090" name="Oval 1089">
-                      <a:extLst>
-                        <a:ext uri="{FF2B5EF4-FFF2-40B4-BE49-F238E27FC236}">
-                          <a16:creationId xmlns:a16="http://schemas.microsoft.com/office/drawing/2014/main" id="{E2E2180C-5B5A-CA3C-B2FB-E18B0CF0373E}"/>
-                        </a:ext>
-                      </a:extLst>
-                    </p:cNvPr>
-                    <p:cNvSpPr/>
-                    <p:nvPr/>
-                  </p:nvSpPr>
-                  <p:spPr>
-                    <a:xfrm>
-                      <a:off x="2203173" y="2481469"/>
-                      <a:ext cx="1404730" cy="1404730"/>
-                    </a:xfrm>
-                    <a:prstGeom prst="ellipse">
-                      <a:avLst/>
-                    </a:prstGeom>
-                    <a:solidFill>
-                      <a:schemeClr val="bg1"/>
-                    </a:solidFill>
-                    <a:ln w="12700">
-                      <a:solidFill>
-                        <a:schemeClr val="tx1"/>
-                      </a:solidFill>
-                    </a:ln>
-                  </p:spPr>
-                  <p:style>
-                    <a:lnRef idx="0">
-                      <a:scrgbClr r="0" g="0" b="0"/>
-                    </a:lnRef>
-                    <a:fillRef idx="0">
-                      <a:scrgbClr r="0" g="0" b="0"/>
-                    </a:fillRef>
-                    <a:effectRef idx="0">
-                      <a:scrgbClr r="0" g="0" b="0"/>
-                    </a:effectRef>
-                    <a:fontRef idx="minor">
-                      <a:schemeClr val="lt1"/>
-                    </a:fontRef>
-                  </p:style>
-                  <p:txBody>
-                    <a:bodyPr rtlCol="0" anchor="ctr"/>
-                    <a:lstStyle/>
-                    <a:p>
-                      <a:pPr algn="ctr"/>
-                      <a:endParaRPr lang="fr-FR">
-                        <a:ln w="0"/>
-                        <a:solidFill>
-                          <a:schemeClr val="tx1"/>
-                        </a:solidFill>
-                        <a:effectLst>
-                          <a:outerShdw blurRad="38100" dist="19050" dir="2700000" algn="tl" rotWithShape="0">
-                            <a:schemeClr val="dk1">
-                              <a:alpha val="40000"/>
-                            </a:schemeClr>
-                          </a:outerShdw>
-                        </a:effectLst>
-                      </a:endParaRPr>
-                    </a:p>
-                  </p:txBody>
-                </p:sp>
-                <p:pic>
-                  <p:nvPicPr>
-                    <p:cNvPr id="1091" name="Picture 6" descr="Serveur Vectorielle PNG , Serveur, Lien, Connecter PNG et vecteur pour  téléchargement gratuit">
-                      <a:extLst>
-                        <a:ext uri="{FF2B5EF4-FFF2-40B4-BE49-F238E27FC236}">
-                          <a16:creationId xmlns:a16="http://schemas.microsoft.com/office/drawing/2014/main" id="{3E3D4989-E74E-5CA0-BD4F-58E66D507347}"/>
-                        </a:ext>
-                      </a:extLst>
-                    </p:cNvPr>
-                    <p:cNvPicPr>
-                      <a:picLocks noChangeAspect="1" noChangeArrowheads="1"/>
-                    </p:cNvPicPr>
-                    <p:nvPr/>
-                  </p:nvPicPr>
-                  <p:blipFill rotWithShape="1">
-                    <a:blip r:embed="rId4">
-                      <a:extLst>
-                        <a:ext uri="{28A0092B-C50C-407E-A947-70E740481C1C}">
-                          <a14:useLocalDpi xmlns:a14="http://schemas.microsoft.com/office/drawing/2010/main" val="0"/>
-                        </a:ext>
-                      </a:extLst>
-                    </a:blip>
-                    <a:srcRect l="16245" t="10518" r="16227" b="10227"/>
-                    <a:stretch/>
-                  </p:blipFill>
-                  <p:spPr bwMode="auto">
-                    <a:xfrm>
-                      <a:off x="2551411" y="2763773"/>
-                      <a:ext cx="707844" cy="830765"/>
-                    </a:xfrm>
-                    <a:prstGeom prst="rect">
-                      <a:avLst/>
-                    </a:prstGeom>
-                    <a:noFill/>
-                    <a:extLst>
-                      <a:ext uri="{909E8E84-426E-40DD-AFC4-6F175D3DCCD1}">
-                        <a14:hiddenFill xmlns:a14="http://schemas.microsoft.com/office/drawing/2010/main">
-                          <a:solidFill>
-                            <a:srgbClr val="FFFFFF"/>
-                          </a:solidFill>
-                        </a14:hiddenFill>
-                      </a:ext>
-                    </a:extLst>
-                  </p:spPr>
-                </p:pic>
-              </p:grpSp>
-              <p:cxnSp>
-                <p:nvCxnSpPr>
-                  <p:cNvPr id="1081" name="Straight Connector 1080">
-                    <a:extLst>
-                      <a:ext uri="{FF2B5EF4-FFF2-40B4-BE49-F238E27FC236}">
-                        <a16:creationId xmlns:a16="http://schemas.microsoft.com/office/drawing/2014/main" id="{CD76EC95-4123-27D7-D9BB-FE67067F5855}"/>
-                      </a:ext>
-                    </a:extLst>
-                  </p:cNvPr>
-                  <p:cNvCxnSpPr>
-                    <a:cxnSpLocks/>
-                    <a:stCxn id="1098" idx="6"/>
-                    <a:endCxn id="1090" idx="2"/>
-                  </p:cNvCxnSpPr>
-                  <p:nvPr/>
-                </p:nvCxnSpPr>
-                <p:spPr>
-                  <a:xfrm flipV="1">
-                    <a:off x="5761218" y="2854056"/>
-                    <a:ext cx="1997572" cy="4379"/>
-                  </a:xfrm>
-                  <a:prstGeom prst="line">
-                    <a:avLst/>
-                  </a:prstGeom>
-                  <a:ln>
-                    <a:solidFill>
-                      <a:schemeClr val="tx1"/>
-                    </a:solidFill>
-                  </a:ln>
-                </p:spPr>
-                <p:style>
-                  <a:lnRef idx="2">
-                    <a:schemeClr val="dk1"/>
-                  </a:lnRef>
-                  <a:fillRef idx="0">
-                    <a:schemeClr val="dk1"/>
-                  </a:fillRef>
-                  <a:effectRef idx="1">
-                    <a:schemeClr val="dk1"/>
-                  </a:effectRef>
-                  <a:fontRef idx="minor">
-                    <a:schemeClr val="tx1"/>
-                  </a:fontRef>
-                </p:style>
-              </p:cxnSp>
-              <p:cxnSp>
-                <p:nvCxnSpPr>
-                  <p:cNvPr id="1082" name="Straight Connector 1081">
-                    <a:extLst>
-                      <a:ext uri="{FF2B5EF4-FFF2-40B4-BE49-F238E27FC236}">
-                        <a16:creationId xmlns:a16="http://schemas.microsoft.com/office/drawing/2014/main" id="{DDAAB59B-B560-868A-3F13-9FBD53DAF94C}"/>
-                      </a:ext>
-                    </a:extLst>
-                  </p:cNvPr>
-                  <p:cNvCxnSpPr>
-                    <a:cxnSpLocks/>
-                    <a:stCxn id="1092" idx="6"/>
-                    <a:endCxn id="1094" idx="2"/>
-                  </p:cNvCxnSpPr>
-                  <p:nvPr/>
-                </p:nvCxnSpPr>
-                <p:spPr>
-                  <a:xfrm flipV="1">
-                    <a:off x="6426374" y="4652539"/>
-                    <a:ext cx="669760" cy="4379"/>
-                  </a:xfrm>
-                  <a:prstGeom prst="line">
-                    <a:avLst/>
-                  </a:prstGeom>
-                  <a:ln>
-                    <a:solidFill>
-                      <a:schemeClr val="tx1"/>
-                    </a:solidFill>
-                  </a:ln>
-                </p:spPr>
-                <p:style>
-                  <a:lnRef idx="2">
-                    <a:schemeClr val="dk1"/>
-                  </a:lnRef>
-                  <a:fillRef idx="0">
-                    <a:schemeClr val="dk1"/>
-                  </a:fillRef>
-                  <a:effectRef idx="1">
-                    <a:schemeClr val="dk1"/>
-                  </a:effectRef>
-                  <a:fontRef idx="minor">
-                    <a:schemeClr val="tx1"/>
-                  </a:fontRef>
-                </p:style>
-              </p:cxnSp>
-              <p:cxnSp>
-                <p:nvCxnSpPr>
-                  <p:cNvPr id="1083" name="Straight Connector 1082">
-                    <a:extLst>
-                      <a:ext uri="{FF2B5EF4-FFF2-40B4-BE49-F238E27FC236}">
-                        <a16:creationId xmlns:a16="http://schemas.microsoft.com/office/drawing/2014/main" id="{91EB4BE8-9379-CC46-6BA3-C5ABEC06A6C1}"/>
-                      </a:ext>
-                    </a:extLst>
-                  </p:cNvPr>
-                  <p:cNvCxnSpPr>
-                    <a:cxnSpLocks/>
-                    <a:endCxn id="1094" idx="0"/>
-                  </p:cNvCxnSpPr>
-                  <p:nvPr/>
-                </p:nvCxnSpPr>
-                <p:spPr>
-                  <a:xfrm>
-                    <a:off x="7041309" y="2139966"/>
-                    <a:ext cx="719981" cy="1855220"/>
-                  </a:xfrm>
-                  <a:prstGeom prst="line">
-                    <a:avLst/>
-                  </a:prstGeom>
-                  <a:ln>
-                    <a:solidFill>
-                      <a:schemeClr val="tx1"/>
-                    </a:solidFill>
-                  </a:ln>
-                </p:spPr>
-                <p:style>
-                  <a:lnRef idx="2">
-                    <a:schemeClr val="dk1"/>
-                  </a:lnRef>
-                  <a:fillRef idx="0">
-                    <a:schemeClr val="dk1"/>
-                  </a:fillRef>
-                  <a:effectRef idx="1">
-                    <a:schemeClr val="dk1"/>
-                  </a:effectRef>
-                  <a:fontRef idx="minor">
-                    <a:schemeClr val="tx1"/>
-                  </a:fontRef>
-                </p:style>
-              </p:cxnSp>
-              <p:cxnSp>
-                <p:nvCxnSpPr>
-                  <p:cNvPr id="1084" name="Straight Connector 1083">
-                    <a:extLst>
-                      <a:ext uri="{FF2B5EF4-FFF2-40B4-BE49-F238E27FC236}">
-                        <a16:creationId xmlns:a16="http://schemas.microsoft.com/office/drawing/2014/main" id="{2A21CBA0-DB5F-BA1D-48AE-4AD98D644E86}"/>
-                      </a:ext>
-                    </a:extLst>
-                  </p:cNvPr>
-                  <p:cNvCxnSpPr>
-                    <a:cxnSpLocks/>
-                    <a:stCxn id="1098" idx="4"/>
-                    <a:endCxn id="1092" idx="1"/>
-                  </p:cNvCxnSpPr>
-                  <p:nvPr/>
-                </p:nvCxnSpPr>
-                <p:spPr>
-                  <a:xfrm>
-                    <a:off x="5096062" y="3515787"/>
-                    <a:ext cx="194820" cy="676312"/>
-                  </a:xfrm>
-                  <a:prstGeom prst="line">
-                    <a:avLst/>
-                  </a:prstGeom>
-                  <a:ln>
-                    <a:solidFill>
-                      <a:schemeClr val="tx1"/>
-                    </a:solidFill>
-                  </a:ln>
-                </p:spPr>
-                <p:style>
-                  <a:lnRef idx="2">
-                    <a:schemeClr val="dk1"/>
-                  </a:lnRef>
-                  <a:fillRef idx="0">
-                    <a:schemeClr val="dk1"/>
-                  </a:fillRef>
-                  <a:effectRef idx="1">
-                    <a:schemeClr val="dk1"/>
-                  </a:effectRef>
-                  <a:fontRef idx="minor">
-                    <a:schemeClr val="tx1"/>
-                  </a:fontRef>
-                </p:style>
-              </p:cxnSp>
-              <p:cxnSp>
-                <p:nvCxnSpPr>
-                  <p:cNvPr id="1085" name="Straight Connector 1084">
-                    <a:extLst>
-                      <a:ext uri="{FF2B5EF4-FFF2-40B4-BE49-F238E27FC236}">
-                        <a16:creationId xmlns:a16="http://schemas.microsoft.com/office/drawing/2014/main" id="{904BB31B-0CE0-9379-367B-CCD27A949FE4}"/>
-                      </a:ext>
-                    </a:extLst>
-                  </p:cNvPr>
-                  <p:cNvCxnSpPr>
-                    <a:cxnSpLocks/>
-                    <a:stCxn id="1096" idx="5"/>
-                    <a:endCxn id="1090" idx="1"/>
-                  </p:cNvCxnSpPr>
-                  <p:nvPr/>
-                </p:nvCxnSpPr>
-                <p:spPr>
-                  <a:xfrm>
-                    <a:off x="7263801" y="1997225"/>
-                    <a:ext cx="689809" cy="392012"/>
-                  </a:xfrm>
-                  <a:prstGeom prst="line">
-                    <a:avLst/>
-                  </a:prstGeom>
-                  <a:ln>
-                    <a:solidFill>
-                      <a:schemeClr val="tx1"/>
-                    </a:solidFill>
-                  </a:ln>
-                </p:spPr>
-                <p:style>
-                  <a:lnRef idx="2">
-                    <a:schemeClr val="dk1"/>
-                  </a:lnRef>
-                  <a:fillRef idx="0">
-                    <a:schemeClr val="dk1"/>
-                  </a:fillRef>
-                  <a:effectRef idx="1">
-                    <a:schemeClr val="dk1"/>
-                  </a:effectRef>
-                  <a:fontRef idx="minor">
-                    <a:schemeClr val="tx1"/>
-                  </a:fontRef>
-                </p:style>
-              </p:cxnSp>
-              <p:cxnSp>
-                <p:nvCxnSpPr>
-                  <p:cNvPr id="1086" name="Straight Connector 1085">
-                    <a:extLst>
-                      <a:ext uri="{FF2B5EF4-FFF2-40B4-BE49-F238E27FC236}">
-                        <a16:creationId xmlns:a16="http://schemas.microsoft.com/office/drawing/2014/main" id="{EDC32E6E-07BA-0B21-D0EF-448C9A245F6B}"/>
-                      </a:ext>
-                    </a:extLst>
-                  </p:cNvPr>
-                  <p:cNvCxnSpPr>
-                    <a:cxnSpLocks/>
-                    <a:stCxn id="1096" idx="3"/>
-                    <a:endCxn id="1098" idx="7"/>
-                  </p:cNvCxnSpPr>
-                  <p:nvPr/>
-                </p:nvCxnSpPr>
-                <p:spPr>
-                  <a:xfrm flipH="1">
-                    <a:off x="5566398" y="1997225"/>
-                    <a:ext cx="756731" cy="396391"/>
-                  </a:xfrm>
-                  <a:prstGeom prst="line">
-                    <a:avLst/>
-                  </a:prstGeom>
-                  <a:ln>
-                    <a:solidFill>
-                      <a:schemeClr val="tx1"/>
-                    </a:solidFill>
-                  </a:ln>
-                </p:spPr>
-                <p:style>
-                  <a:lnRef idx="2">
-                    <a:schemeClr val="dk1"/>
-                  </a:lnRef>
-                  <a:fillRef idx="0">
-                    <a:schemeClr val="dk1"/>
-                  </a:fillRef>
-                  <a:effectRef idx="1">
-                    <a:schemeClr val="dk1"/>
-                  </a:effectRef>
-                  <a:fontRef idx="minor">
-                    <a:schemeClr val="tx1"/>
-                  </a:fontRef>
-                </p:style>
-              </p:cxnSp>
-              <p:cxnSp>
-                <p:nvCxnSpPr>
-                  <p:cNvPr id="1087" name="Straight Connector 1086">
-                    <a:extLst>
-                      <a:ext uri="{FF2B5EF4-FFF2-40B4-BE49-F238E27FC236}">
-                        <a16:creationId xmlns:a16="http://schemas.microsoft.com/office/drawing/2014/main" id="{9D14BB86-7895-1A91-0D28-EB811CE9997E}"/>
-                      </a:ext>
-                    </a:extLst>
-                  </p:cNvPr>
-                  <p:cNvCxnSpPr>
-                    <a:cxnSpLocks/>
-                    <a:stCxn id="1090" idx="4"/>
-                    <a:endCxn id="1094" idx="7"/>
-                  </p:cNvCxnSpPr>
-                  <p:nvPr/>
-                </p:nvCxnSpPr>
-                <p:spPr>
-                  <a:xfrm flipH="1">
-                    <a:off x="8231626" y="3511408"/>
-                    <a:ext cx="192320" cy="676312"/>
-                  </a:xfrm>
-                  <a:prstGeom prst="line">
-                    <a:avLst/>
-                  </a:prstGeom>
-                  <a:ln>
-                    <a:solidFill>
-                      <a:schemeClr val="tx1"/>
-                    </a:solidFill>
-                  </a:ln>
-                </p:spPr>
-                <p:style>
-                  <a:lnRef idx="2">
-                    <a:schemeClr val="dk1"/>
-                  </a:lnRef>
-                  <a:fillRef idx="0">
-                    <a:schemeClr val="dk1"/>
-                  </a:fillRef>
-                  <a:effectRef idx="1">
-                    <a:schemeClr val="dk1"/>
-                  </a:effectRef>
-                  <a:fontRef idx="minor">
-                    <a:schemeClr val="tx1"/>
-                  </a:fontRef>
-                </p:style>
-              </p:cxnSp>
-              <p:cxnSp>
-                <p:nvCxnSpPr>
-                  <p:cNvPr id="1088" name="Straight Connector 1087">
-                    <a:extLst>
-                      <a:ext uri="{FF2B5EF4-FFF2-40B4-BE49-F238E27FC236}">
-                        <a16:creationId xmlns:a16="http://schemas.microsoft.com/office/drawing/2014/main" id="{B078589B-A9C1-62B6-10A7-88964712FE42}"/>
-                      </a:ext>
-                    </a:extLst>
-                  </p:cNvPr>
-                  <p:cNvCxnSpPr>
-                    <a:cxnSpLocks/>
-                    <a:stCxn id="1092" idx="7"/>
-                    <a:endCxn id="1090" idx="3"/>
-                  </p:cNvCxnSpPr>
-                  <p:nvPr/>
-                </p:nvCxnSpPr>
-                <p:spPr>
-                  <a:xfrm flipV="1">
-                    <a:off x="6231554" y="3318874"/>
-                    <a:ext cx="1722056" cy="873225"/>
-                  </a:xfrm>
-                  <a:prstGeom prst="line">
-                    <a:avLst/>
-                  </a:prstGeom>
-                  <a:ln>
-                    <a:solidFill>
-                      <a:schemeClr val="tx1"/>
-                    </a:solidFill>
-                  </a:ln>
-                </p:spPr>
-                <p:style>
-                  <a:lnRef idx="2">
-                    <a:schemeClr val="dk1"/>
-                  </a:lnRef>
-                  <a:fillRef idx="0">
-                    <a:schemeClr val="dk1"/>
-                  </a:fillRef>
-                  <a:effectRef idx="1">
-                    <a:schemeClr val="dk1"/>
-                  </a:effectRef>
-                  <a:fontRef idx="minor">
-                    <a:schemeClr val="tx1"/>
-                  </a:fontRef>
-                </p:style>
-              </p:cxnSp>
-              <p:cxnSp>
-                <p:nvCxnSpPr>
-                  <p:cNvPr id="1089" name="Straight Connector 1088">
-                    <a:extLst>
-                      <a:ext uri="{FF2B5EF4-FFF2-40B4-BE49-F238E27FC236}">
-                        <a16:creationId xmlns:a16="http://schemas.microsoft.com/office/drawing/2014/main" id="{B0EFA1DA-9877-6E77-D3CC-DB0D5DB5A899}"/>
-                      </a:ext>
-                    </a:extLst>
-                  </p:cNvPr>
-                  <p:cNvCxnSpPr>
-                    <a:cxnSpLocks/>
-                    <a:stCxn id="1098" idx="5"/>
-                    <a:endCxn id="1094" idx="1"/>
-                  </p:cNvCxnSpPr>
-                  <p:nvPr/>
-                </p:nvCxnSpPr>
-                <p:spPr>
-                  <a:xfrm>
-                    <a:off x="5566398" y="3323253"/>
-                    <a:ext cx="1724556" cy="864467"/>
-                  </a:xfrm>
-                  <a:prstGeom prst="line">
-                    <a:avLst/>
-                  </a:prstGeom>
-                  <a:ln>
-                    <a:solidFill>
-                      <a:schemeClr val="tx1"/>
-                    </a:solidFill>
-                  </a:ln>
-                </p:spPr>
-                <p:style>
-                  <a:lnRef idx="2">
-                    <a:schemeClr val="dk1"/>
-                  </a:lnRef>
-                  <a:fillRef idx="0">
-                    <a:schemeClr val="dk1"/>
-                  </a:fillRef>
-                  <a:effectRef idx="1">
-                    <a:schemeClr val="dk1"/>
-                  </a:effectRef>
-                  <a:fontRef idx="minor">
-                    <a:schemeClr val="tx1"/>
-                  </a:fontRef>
-                </p:style>
-              </p:cxnSp>
-            </p:grpSp>
-          </p:grpSp>
-          <p:grpSp>
-            <p:nvGrpSpPr>
-              <p:cNvPr id="1042" name="Group 1041">
-                <a:extLst>
-                  <a:ext uri="{FF2B5EF4-FFF2-40B4-BE49-F238E27FC236}">
-                    <a16:creationId xmlns:a16="http://schemas.microsoft.com/office/drawing/2014/main" id="{B7B83EC6-087F-89B6-E97C-851AE86BFD0B}"/>
-                  </a:ext>
-                </a:extLst>
-              </p:cNvPr>
-              <p:cNvGrpSpPr/>
-              <p:nvPr/>
-            </p:nvGrpSpPr>
-            <p:grpSpPr>
-              <a:xfrm>
-                <a:off x="938288" y="3312481"/>
-                <a:ext cx="653138" cy="657814"/>
-                <a:chOff x="5223901" y="2189808"/>
-                <a:chExt cx="1404730" cy="1404730"/>
-              </a:xfrm>
-            </p:grpSpPr>
-            <p:sp>
-              <p:nvSpPr>
-                <p:cNvPr id="1070" name="Rectangle 1069">
-                  <a:extLst>
-                    <a:ext uri="{FF2B5EF4-FFF2-40B4-BE49-F238E27FC236}">
-                      <a16:creationId xmlns:a16="http://schemas.microsoft.com/office/drawing/2014/main" id="{F1F76BF2-051B-C668-1B10-81BB7320358D}"/>
-                    </a:ext>
-                  </a:extLst>
-                </p:cNvPr>
-                <p:cNvSpPr/>
-                <p:nvPr/>
-              </p:nvSpPr>
-              <p:spPr>
-                <a:xfrm>
-                  <a:off x="5223901" y="2189808"/>
-                  <a:ext cx="1404730" cy="1404730"/>
-                </a:xfrm>
-                <a:prstGeom prst="rect">
-                  <a:avLst/>
-                </a:prstGeom>
-                <a:ln w="12700">
-                  <a:solidFill>
-                    <a:schemeClr val="tx1"/>
-                  </a:solidFill>
-                </a:ln>
-              </p:spPr>
-              <p:style>
-                <a:lnRef idx="2">
-                  <a:schemeClr val="accent6"/>
-                </a:lnRef>
-                <a:fillRef idx="1">
-                  <a:schemeClr val="lt1"/>
-                </a:fillRef>
-                <a:effectRef idx="0">
-                  <a:schemeClr val="accent6"/>
-                </a:effectRef>
-                <a:fontRef idx="minor">
-                  <a:schemeClr val="dk1"/>
-                </a:fontRef>
-              </p:style>
-              <p:txBody>
-                <a:bodyPr rtlCol="0" anchor="ctr"/>
-                <a:lstStyle/>
-                <a:p>
-                  <a:pPr algn="ctr"/>
-                  <a:endParaRPr lang="fr-FR"/>
-                </a:p>
-              </p:txBody>
-            </p:sp>
-            <p:grpSp>
-              <p:nvGrpSpPr>
-                <p:cNvPr id="1071" name="Group 1070">
-                  <a:extLst>
-                    <a:ext uri="{FF2B5EF4-FFF2-40B4-BE49-F238E27FC236}">
-                      <a16:creationId xmlns:a16="http://schemas.microsoft.com/office/drawing/2014/main" id="{112E6249-967B-868A-13BE-2544EBF4EF72}"/>
-                    </a:ext>
-                  </a:extLst>
-                </p:cNvPr>
-                <p:cNvGrpSpPr/>
-                <p:nvPr/>
-              </p:nvGrpSpPr>
-              <p:grpSpPr>
-                <a:xfrm>
-                  <a:off x="5451276" y="2391808"/>
-                  <a:ext cx="949980" cy="997778"/>
-                  <a:chOff x="4206340" y="524841"/>
-                  <a:chExt cx="949980" cy="997778"/>
-                </a:xfrm>
-              </p:grpSpPr>
-              <p:pic>
-                <p:nvPicPr>
-                  <p:cNvPr id="1072" name="Picture 2" descr="Apple IPhone X Revealed: Photos, Specs, Features, Release, 57% OFF">
-                    <a:extLst>
-                      <a:ext uri="{FF2B5EF4-FFF2-40B4-BE49-F238E27FC236}">
-                        <a16:creationId xmlns:a16="http://schemas.microsoft.com/office/drawing/2014/main" id="{1A0B7F80-5A31-FF35-33F6-5AA1D06B8B55}"/>
-                      </a:ext>
-                    </a:extLst>
-                  </p:cNvPr>
-                  <p:cNvPicPr>
-                    <a:picLocks noChangeAspect="1" noChangeArrowheads="1"/>
-                  </p:cNvPicPr>
-                  <p:nvPr/>
-                </p:nvPicPr>
-                <p:blipFill>
-                  <a:blip r:embed="rId2">
-                    <a:extLst>
-                      <a:ext uri="{28A0092B-C50C-407E-A947-70E740481C1C}">
-                        <a14:useLocalDpi xmlns:a14="http://schemas.microsoft.com/office/drawing/2010/main" val="0"/>
-                      </a:ext>
-                    </a:extLst>
-                  </a:blip>
-                  <a:srcRect/>
-                  <a:stretch>
-                    <a:fillRect/>
-                  </a:stretch>
-                </p:blipFill>
-                <p:spPr bwMode="auto">
-                  <a:xfrm>
-                    <a:off x="4206340" y="524841"/>
-                    <a:ext cx="949980" cy="997778"/>
-                  </a:xfrm>
-                  <a:prstGeom prst="rect">
-                    <a:avLst/>
-                  </a:prstGeom>
-                  <a:noFill/>
-                  <a:extLst>
-                    <a:ext uri="{909E8E84-426E-40DD-AFC4-6F175D3DCCD1}">
-                      <a14:hiddenFill xmlns:a14="http://schemas.microsoft.com/office/drawing/2010/main">
-                        <a:solidFill>
-                          <a:srgbClr val="FFFFFF"/>
-                        </a:solidFill>
-                      </a14:hiddenFill>
-                    </a:ext>
-                  </a:extLst>
-                </p:spPr>
-              </p:pic>
-              <p:pic>
-                <p:nvPicPr>
-                  <p:cNvPr id="1073" name="Picture 1072" descr="A white background with black dots&#10;&#10;Description automatically generated">
-                    <a:extLst>
-                      <a:ext uri="{FF2B5EF4-FFF2-40B4-BE49-F238E27FC236}">
-                        <a16:creationId xmlns:a16="http://schemas.microsoft.com/office/drawing/2014/main" id="{A4487E19-BB19-8434-B041-BF41ED5DE357}"/>
-                      </a:ext>
-                    </a:extLst>
-                  </p:cNvPr>
-                  <p:cNvPicPr>
-                    <a:picLocks noChangeAspect="1"/>
-                  </p:cNvPicPr>
-                  <p:nvPr/>
-                </p:nvPicPr>
-                <p:blipFill>
-                  <a:blip r:embed="rId3"/>
-                  <a:stretch>
-                    <a:fillRect/>
-                  </a:stretch>
-                </p:blipFill>
-                <p:spPr>
-                  <a:xfrm>
-                    <a:off x="4511596" y="808411"/>
-                    <a:ext cx="292519" cy="314710"/>
-                  </a:xfrm>
-                  <a:prstGeom prst="rect">
-                    <a:avLst/>
-                  </a:prstGeom>
-                </p:spPr>
-              </p:pic>
-            </p:grpSp>
-          </p:grpSp>
-          <p:grpSp>
-            <p:nvGrpSpPr>
-              <p:cNvPr id="1043" name="Group 1042">
-                <a:extLst>
-                  <a:ext uri="{FF2B5EF4-FFF2-40B4-BE49-F238E27FC236}">
-                    <a16:creationId xmlns:a16="http://schemas.microsoft.com/office/drawing/2014/main" id="{FAC26345-73ED-6F91-F3AC-592BB3264D4F}"/>
-                  </a:ext>
-                </a:extLst>
-              </p:cNvPr>
-              <p:cNvGrpSpPr/>
-              <p:nvPr/>
-            </p:nvGrpSpPr>
-            <p:grpSpPr>
-              <a:xfrm>
-                <a:off x="3430793" y="4391158"/>
-                <a:ext cx="653138" cy="657814"/>
-                <a:chOff x="5223901" y="2189808"/>
-                <a:chExt cx="1404730" cy="1404730"/>
-              </a:xfrm>
-            </p:grpSpPr>
-            <p:sp>
-              <p:nvSpPr>
-                <p:cNvPr id="1066" name="Rectangle 1065">
-                  <a:extLst>
-                    <a:ext uri="{FF2B5EF4-FFF2-40B4-BE49-F238E27FC236}">
-                      <a16:creationId xmlns:a16="http://schemas.microsoft.com/office/drawing/2014/main" id="{E4DE4F11-8A5F-8142-2A6E-B1A4F275AFC4}"/>
-                    </a:ext>
-                  </a:extLst>
-                </p:cNvPr>
-                <p:cNvSpPr/>
-                <p:nvPr/>
-              </p:nvSpPr>
-              <p:spPr>
-                <a:xfrm>
-                  <a:off x="5223901" y="2189808"/>
-                  <a:ext cx="1404730" cy="1404730"/>
-                </a:xfrm>
-                <a:prstGeom prst="rect">
-                  <a:avLst/>
-                </a:prstGeom>
-                <a:ln w="12700">
-                  <a:solidFill>
-                    <a:schemeClr val="tx1"/>
-                  </a:solidFill>
-                </a:ln>
-              </p:spPr>
-              <p:style>
-                <a:lnRef idx="2">
-                  <a:schemeClr val="accent6"/>
-                </a:lnRef>
-                <a:fillRef idx="1">
-                  <a:schemeClr val="lt1"/>
-                </a:fillRef>
-                <a:effectRef idx="0">
-                  <a:schemeClr val="accent6"/>
-                </a:effectRef>
-                <a:fontRef idx="minor">
-                  <a:schemeClr val="dk1"/>
-                </a:fontRef>
-              </p:style>
-              <p:txBody>
-                <a:bodyPr rtlCol="0" anchor="ctr"/>
-                <a:lstStyle/>
-                <a:p>
-                  <a:pPr algn="ctr"/>
-                  <a:endParaRPr lang="fr-FR"/>
-                </a:p>
-              </p:txBody>
-            </p:sp>
-            <p:grpSp>
-              <p:nvGrpSpPr>
-                <p:cNvPr id="1067" name="Group 1066">
-                  <a:extLst>
-                    <a:ext uri="{FF2B5EF4-FFF2-40B4-BE49-F238E27FC236}">
-                      <a16:creationId xmlns:a16="http://schemas.microsoft.com/office/drawing/2014/main" id="{83B006AB-51FD-E170-5878-C5C2817564BD}"/>
-                    </a:ext>
-                  </a:extLst>
-                </p:cNvPr>
-                <p:cNvGrpSpPr/>
-                <p:nvPr/>
-              </p:nvGrpSpPr>
-              <p:grpSpPr>
-                <a:xfrm>
-                  <a:off x="5451276" y="2391808"/>
-                  <a:ext cx="949980" cy="997778"/>
-                  <a:chOff x="4206340" y="524841"/>
-                  <a:chExt cx="949980" cy="997778"/>
-                </a:xfrm>
-              </p:grpSpPr>
-              <p:pic>
-                <p:nvPicPr>
-                  <p:cNvPr id="1068" name="Picture 2" descr="Apple IPhone X Revealed: Photos, Specs, Features, Release, 57% OFF">
-                    <a:extLst>
-                      <a:ext uri="{FF2B5EF4-FFF2-40B4-BE49-F238E27FC236}">
-                        <a16:creationId xmlns:a16="http://schemas.microsoft.com/office/drawing/2014/main" id="{B1E16D68-AA46-C72A-8B6F-0D9F1A8EA819}"/>
-                      </a:ext>
-                    </a:extLst>
-                  </p:cNvPr>
-                  <p:cNvPicPr>
-                    <a:picLocks noChangeAspect="1" noChangeArrowheads="1"/>
-                  </p:cNvPicPr>
-                  <p:nvPr/>
-                </p:nvPicPr>
-                <p:blipFill>
-                  <a:blip r:embed="rId2">
-                    <a:extLst>
-                      <a:ext uri="{28A0092B-C50C-407E-A947-70E740481C1C}">
-                        <a14:useLocalDpi xmlns:a14="http://schemas.microsoft.com/office/drawing/2010/main" val="0"/>
-                      </a:ext>
-                    </a:extLst>
-                  </a:blip>
-                  <a:srcRect/>
-                  <a:stretch>
-                    <a:fillRect/>
-                  </a:stretch>
-                </p:blipFill>
-                <p:spPr bwMode="auto">
-                  <a:xfrm>
-                    <a:off x="4206340" y="524841"/>
-                    <a:ext cx="949980" cy="997778"/>
-                  </a:xfrm>
-                  <a:prstGeom prst="rect">
-                    <a:avLst/>
-                  </a:prstGeom>
-                  <a:noFill/>
-                  <a:extLst>
-                    <a:ext uri="{909E8E84-426E-40DD-AFC4-6F175D3DCCD1}">
-                      <a14:hiddenFill xmlns:a14="http://schemas.microsoft.com/office/drawing/2010/main">
-                        <a:solidFill>
-                          <a:srgbClr val="FFFFFF"/>
-                        </a:solidFill>
-                      </a14:hiddenFill>
-                    </a:ext>
-                  </a:extLst>
-                </p:spPr>
-              </p:pic>
-              <p:pic>
-                <p:nvPicPr>
-                  <p:cNvPr id="1069" name="Picture 1068" descr="A white background with black dots&#10;&#10;Description automatically generated">
-                    <a:extLst>
-                      <a:ext uri="{FF2B5EF4-FFF2-40B4-BE49-F238E27FC236}">
-                        <a16:creationId xmlns:a16="http://schemas.microsoft.com/office/drawing/2014/main" id="{5D57C695-F276-D254-5B34-3C497DF6E358}"/>
-                      </a:ext>
-                    </a:extLst>
-                  </p:cNvPr>
-                  <p:cNvPicPr>
-                    <a:picLocks noChangeAspect="1"/>
-                  </p:cNvPicPr>
-                  <p:nvPr/>
-                </p:nvPicPr>
-                <p:blipFill>
-                  <a:blip r:embed="rId3"/>
-                  <a:stretch>
-                    <a:fillRect/>
-                  </a:stretch>
-                </p:blipFill>
-                <p:spPr>
-                  <a:xfrm>
-                    <a:off x="4511596" y="808411"/>
-                    <a:ext cx="292519" cy="314710"/>
-                  </a:xfrm>
-                  <a:prstGeom prst="rect">
-                    <a:avLst/>
-                  </a:prstGeom>
-                </p:spPr>
-              </p:pic>
-            </p:grpSp>
-          </p:grpSp>
-          <p:grpSp>
-            <p:nvGrpSpPr>
-              <p:cNvPr id="1044" name="Group 1043">
-                <a:extLst>
-                  <a:ext uri="{FF2B5EF4-FFF2-40B4-BE49-F238E27FC236}">
-                    <a16:creationId xmlns:a16="http://schemas.microsoft.com/office/drawing/2014/main" id="{406AEA20-FA1B-7027-70AC-F4300D16E249}"/>
-                  </a:ext>
-                </a:extLst>
-              </p:cNvPr>
-              <p:cNvGrpSpPr/>
-              <p:nvPr/>
-            </p:nvGrpSpPr>
-            <p:grpSpPr>
-              <a:xfrm>
-                <a:off x="5118979" y="2825326"/>
-                <a:ext cx="653138" cy="657814"/>
-                <a:chOff x="5223901" y="2189808"/>
-                <a:chExt cx="1404730" cy="1404730"/>
-              </a:xfrm>
-            </p:grpSpPr>
-            <p:sp>
-              <p:nvSpPr>
-                <p:cNvPr id="1062" name="Rectangle 1061">
-                  <a:extLst>
-                    <a:ext uri="{FF2B5EF4-FFF2-40B4-BE49-F238E27FC236}">
-                      <a16:creationId xmlns:a16="http://schemas.microsoft.com/office/drawing/2014/main" id="{AC6033A0-7217-5519-002D-40C684D55F41}"/>
-                    </a:ext>
-                  </a:extLst>
-                </p:cNvPr>
-                <p:cNvSpPr/>
-                <p:nvPr/>
-              </p:nvSpPr>
-              <p:spPr>
-                <a:xfrm>
-                  <a:off x="5223901" y="2189808"/>
-                  <a:ext cx="1404730" cy="1404730"/>
-                </a:xfrm>
-                <a:prstGeom prst="rect">
-                  <a:avLst/>
-                </a:prstGeom>
-                <a:ln w="12700">
-                  <a:solidFill>
-                    <a:schemeClr val="tx1"/>
-                  </a:solidFill>
-                </a:ln>
-              </p:spPr>
-              <p:style>
-                <a:lnRef idx="2">
-                  <a:schemeClr val="accent6"/>
-                </a:lnRef>
-                <a:fillRef idx="1">
-                  <a:schemeClr val="lt1"/>
-                </a:fillRef>
-                <a:effectRef idx="0">
-                  <a:schemeClr val="accent6"/>
-                </a:effectRef>
-                <a:fontRef idx="minor">
-                  <a:schemeClr val="dk1"/>
-                </a:fontRef>
-              </p:style>
-              <p:txBody>
-                <a:bodyPr rtlCol="0" anchor="ctr"/>
-                <a:lstStyle/>
-                <a:p>
-                  <a:pPr algn="ctr"/>
-                  <a:endParaRPr lang="fr-FR"/>
-                </a:p>
-              </p:txBody>
-            </p:sp>
-            <p:grpSp>
-              <p:nvGrpSpPr>
-                <p:cNvPr id="1063" name="Group 1062">
-                  <a:extLst>
-                    <a:ext uri="{FF2B5EF4-FFF2-40B4-BE49-F238E27FC236}">
-                      <a16:creationId xmlns:a16="http://schemas.microsoft.com/office/drawing/2014/main" id="{3190079F-A953-8BD8-4657-26742C51B07F}"/>
-                    </a:ext>
-                  </a:extLst>
-                </p:cNvPr>
-                <p:cNvGrpSpPr/>
-                <p:nvPr/>
-              </p:nvGrpSpPr>
-              <p:grpSpPr>
-                <a:xfrm>
-                  <a:off x="5451276" y="2391808"/>
-                  <a:ext cx="949980" cy="997778"/>
-                  <a:chOff x="4206340" y="524841"/>
-                  <a:chExt cx="949980" cy="997778"/>
-                </a:xfrm>
-              </p:grpSpPr>
-              <p:pic>
-                <p:nvPicPr>
-                  <p:cNvPr id="1064" name="Picture 2" descr="Apple IPhone X Revealed: Photos, Specs, Features, Release, 57% OFF">
-                    <a:extLst>
-                      <a:ext uri="{FF2B5EF4-FFF2-40B4-BE49-F238E27FC236}">
-                        <a16:creationId xmlns:a16="http://schemas.microsoft.com/office/drawing/2014/main" id="{9F97F458-0A0C-33FD-8100-309E2C372299}"/>
-                      </a:ext>
-                    </a:extLst>
-                  </p:cNvPr>
-                  <p:cNvPicPr>
-                    <a:picLocks noChangeAspect="1" noChangeArrowheads="1"/>
-                  </p:cNvPicPr>
-                  <p:nvPr/>
-                </p:nvPicPr>
-                <p:blipFill>
-                  <a:blip r:embed="rId2">
-                    <a:extLst>
-                      <a:ext uri="{28A0092B-C50C-407E-A947-70E740481C1C}">
-                        <a14:useLocalDpi xmlns:a14="http://schemas.microsoft.com/office/drawing/2010/main" val="0"/>
-                      </a:ext>
-                    </a:extLst>
-                  </a:blip>
-                  <a:srcRect/>
-                  <a:stretch>
-                    <a:fillRect/>
-                  </a:stretch>
-                </p:blipFill>
-                <p:spPr bwMode="auto">
-                  <a:xfrm>
-                    <a:off x="4206340" y="524841"/>
-                    <a:ext cx="949980" cy="997778"/>
-                  </a:xfrm>
-                  <a:prstGeom prst="rect">
-                    <a:avLst/>
-                  </a:prstGeom>
-                  <a:noFill/>
-                  <a:extLst>
-                    <a:ext uri="{909E8E84-426E-40DD-AFC4-6F175D3DCCD1}">
-                      <a14:hiddenFill xmlns:a14="http://schemas.microsoft.com/office/drawing/2010/main">
-                        <a:solidFill>
-                          <a:srgbClr val="FFFFFF"/>
-                        </a:solidFill>
-                      </a14:hiddenFill>
-                    </a:ext>
-                  </a:extLst>
-                </p:spPr>
-              </p:pic>
-              <p:pic>
-                <p:nvPicPr>
-                  <p:cNvPr id="1065" name="Picture 1064" descr="A white background with black dots&#10;&#10;Description automatically generated">
-                    <a:extLst>
-                      <a:ext uri="{FF2B5EF4-FFF2-40B4-BE49-F238E27FC236}">
-                        <a16:creationId xmlns:a16="http://schemas.microsoft.com/office/drawing/2014/main" id="{A6397577-BBF8-4587-E9C1-46AA6DDA95B2}"/>
-                      </a:ext>
-                    </a:extLst>
-                  </p:cNvPr>
-                  <p:cNvPicPr>
-                    <a:picLocks noChangeAspect="1"/>
-                  </p:cNvPicPr>
-                  <p:nvPr/>
-                </p:nvPicPr>
-                <p:blipFill>
-                  <a:blip r:embed="rId3"/>
-                  <a:stretch>
-                    <a:fillRect/>
-                  </a:stretch>
-                </p:blipFill>
-                <p:spPr>
-                  <a:xfrm>
-                    <a:off x="4511596" y="808411"/>
-                    <a:ext cx="292519" cy="314710"/>
-                  </a:xfrm>
-                  <a:prstGeom prst="rect">
-                    <a:avLst/>
-                  </a:prstGeom>
-                </p:spPr>
-              </p:pic>
-            </p:grpSp>
-          </p:grpSp>
-          <p:grpSp>
-            <p:nvGrpSpPr>
-              <p:cNvPr id="1045" name="Group 1044">
-                <a:extLst>
-                  <a:ext uri="{FF2B5EF4-FFF2-40B4-BE49-F238E27FC236}">
-                    <a16:creationId xmlns:a16="http://schemas.microsoft.com/office/drawing/2014/main" id="{3D932F72-D2AF-D0DC-0672-301973430DD0}"/>
-                  </a:ext>
-                </a:extLst>
-              </p:cNvPr>
-              <p:cNvGrpSpPr/>
-              <p:nvPr/>
-            </p:nvGrpSpPr>
-            <p:grpSpPr>
-              <a:xfrm>
-                <a:off x="4841483" y="1699218"/>
-                <a:ext cx="653138" cy="657814"/>
-                <a:chOff x="5223901" y="2189808"/>
-                <a:chExt cx="1404730" cy="1404730"/>
-              </a:xfrm>
-            </p:grpSpPr>
-            <p:sp>
-              <p:nvSpPr>
-                <p:cNvPr id="1058" name="Rectangle 1057">
-                  <a:extLst>
-                    <a:ext uri="{FF2B5EF4-FFF2-40B4-BE49-F238E27FC236}">
-                      <a16:creationId xmlns:a16="http://schemas.microsoft.com/office/drawing/2014/main" id="{7E50FF83-9894-9C22-2A18-E9A2C2D164AB}"/>
-                    </a:ext>
-                  </a:extLst>
-                </p:cNvPr>
-                <p:cNvSpPr/>
-                <p:nvPr/>
-              </p:nvSpPr>
-              <p:spPr>
-                <a:xfrm>
-                  <a:off x="5223901" y="2189808"/>
-                  <a:ext cx="1404730" cy="1404730"/>
-                </a:xfrm>
-                <a:prstGeom prst="rect">
-                  <a:avLst/>
-                </a:prstGeom>
-                <a:ln w="12700">
-                  <a:solidFill>
-                    <a:schemeClr val="tx1"/>
-                  </a:solidFill>
-                </a:ln>
-              </p:spPr>
-              <p:style>
-                <a:lnRef idx="2">
-                  <a:schemeClr val="accent6"/>
-                </a:lnRef>
-                <a:fillRef idx="1">
-                  <a:schemeClr val="lt1"/>
-                </a:fillRef>
-                <a:effectRef idx="0">
-                  <a:schemeClr val="accent6"/>
-                </a:effectRef>
-                <a:fontRef idx="minor">
-                  <a:schemeClr val="dk1"/>
-                </a:fontRef>
-              </p:style>
-              <p:txBody>
-                <a:bodyPr rtlCol="0" anchor="ctr"/>
-                <a:lstStyle/>
-                <a:p>
-                  <a:pPr algn="ctr"/>
-                  <a:endParaRPr lang="fr-FR"/>
-                </a:p>
-              </p:txBody>
-            </p:sp>
-            <p:grpSp>
-              <p:nvGrpSpPr>
-                <p:cNvPr id="1059" name="Group 1058">
-                  <a:extLst>
-                    <a:ext uri="{FF2B5EF4-FFF2-40B4-BE49-F238E27FC236}">
-                      <a16:creationId xmlns:a16="http://schemas.microsoft.com/office/drawing/2014/main" id="{3F4052D7-AE88-68D1-085C-9A47D383EDB8}"/>
-                    </a:ext>
-                  </a:extLst>
-                </p:cNvPr>
-                <p:cNvGrpSpPr/>
-                <p:nvPr/>
-              </p:nvGrpSpPr>
-              <p:grpSpPr>
-                <a:xfrm>
-                  <a:off x="5451276" y="2391808"/>
-                  <a:ext cx="949980" cy="997778"/>
-                  <a:chOff x="4206340" y="524841"/>
-                  <a:chExt cx="949980" cy="997778"/>
-                </a:xfrm>
-              </p:grpSpPr>
-              <p:pic>
-                <p:nvPicPr>
-                  <p:cNvPr id="1060" name="Picture 2" descr="Apple IPhone X Revealed: Photos, Specs, Features, Release, 57% OFF">
-                    <a:extLst>
-                      <a:ext uri="{FF2B5EF4-FFF2-40B4-BE49-F238E27FC236}">
-                        <a16:creationId xmlns:a16="http://schemas.microsoft.com/office/drawing/2014/main" id="{461EE2D9-4054-3998-5626-4FF8340E9724}"/>
-                      </a:ext>
-                    </a:extLst>
-                  </p:cNvPr>
-                  <p:cNvPicPr>
-                    <a:picLocks noChangeAspect="1" noChangeArrowheads="1"/>
-                  </p:cNvPicPr>
-                  <p:nvPr/>
-                </p:nvPicPr>
-                <p:blipFill>
-                  <a:blip r:embed="rId2">
-                    <a:extLst>
-                      <a:ext uri="{28A0092B-C50C-407E-A947-70E740481C1C}">
-                        <a14:useLocalDpi xmlns:a14="http://schemas.microsoft.com/office/drawing/2010/main" val="0"/>
-                      </a:ext>
-                    </a:extLst>
-                  </a:blip>
-                  <a:srcRect/>
-                  <a:stretch>
-                    <a:fillRect/>
-                  </a:stretch>
-                </p:blipFill>
-                <p:spPr bwMode="auto">
-                  <a:xfrm>
-                    <a:off x="4206340" y="524841"/>
-                    <a:ext cx="949980" cy="997778"/>
-                  </a:xfrm>
-                  <a:prstGeom prst="rect">
-                    <a:avLst/>
-                  </a:prstGeom>
-                  <a:noFill/>
-                  <a:extLst>
-                    <a:ext uri="{909E8E84-426E-40DD-AFC4-6F175D3DCCD1}">
-                      <a14:hiddenFill xmlns:a14="http://schemas.microsoft.com/office/drawing/2010/main">
-                        <a:solidFill>
-                          <a:srgbClr val="FFFFFF"/>
-                        </a:solidFill>
-                      </a14:hiddenFill>
-                    </a:ext>
-                  </a:extLst>
-                </p:spPr>
-              </p:pic>
-              <p:pic>
-                <p:nvPicPr>
-                  <p:cNvPr id="1061" name="Picture 1060" descr="A white background with black dots&#10;&#10;Description automatically generated">
-                    <a:extLst>
-                      <a:ext uri="{FF2B5EF4-FFF2-40B4-BE49-F238E27FC236}">
-                        <a16:creationId xmlns:a16="http://schemas.microsoft.com/office/drawing/2014/main" id="{8BAEE9F7-F125-BA22-DF15-892E5BFC82B2}"/>
-                      </a:ext>
-                    </a:extLst>
-                  </p:cNvPr>
-                  <p:cNvPicPr>
-                    <a:picLocks noChangeAspect="1"/>
-                  </p:cNvPicPr>
-                  <p:nvPr/>
-                </p:nvPicPr>
-                <p:blipFill>
-                  <a:blip r:embed="rId3"/>
-                  <a:stretch>
-                    <a:fillRect/>
-                  </a:stretch>
-                </p:blipFill>
-                <p:spPr>
-                  <a:xfrm>
-                    <a:off x="4511596" y="808411"/>
-                    <a:ext cx="292519" cy="314710"/>
-                  </a:xfrm>
-                  <a:prstGeom prst="rect">
-                    <a:avLst/>
-                  </a:prstGeom>
-                </p:spPr>
-              </p:pic>
-            </p:grpSp>
-          </p:grpSp>
-          <p:cxnSp>
-            <p:nvCxnSpPr>
-              <p:cNvPr id="1046" name="Straight Connector 1045">
-                <a:extLst>
-                  <a:ext uri="{FF2B5EF4-FFF2-40B4-BE49-F238E27FC236}">
-                    <a16:creationId xmlns:a16="http://schemas.microsoft.com/office/drawing/2014/main" id="{FBA88356-6C27-B3D5-5AB6-AD6033F83123}"/>
-                  </a:ext>
-                </a:extLst>
-              </p:cNvPr>
-              <p:cNvCxnSpPr>
-                <a:stCxn id="1100" idx="2"/>
-                <a:endCxn id="1098" idx="1"/>
-              </p:cNvCxnSpPr>
-              <p:nvPr/>
-            </p:nvCxnSpPr>
-            <p:spPr>
-              <a:xfrm>
-                <a:off x="1456455" y="2165312"/>
-                <a:ext cx="743944" cy="490429"/>
-              </a:xfrm>
-              <a:prstGeom prst="line">
-                <a:avLst/>
-              </a:prstGeom>
-            </p:spPr>
-            <p:style>
-              <a:lnRef idx="2">
-                <a:schemeClr val="dk1"/>
-              </a:lnRef>
-              <a:fillRef idx="0">
-                <a:schemeClr val="dk1"/>
-              </a:fillRef>
-              <a:effectRef idx="1">
-                <a:schemeClr val="dk1"/>
-              </a:effectRef>
-              <a:fontRef idx="minor">
-                <a:schemeClr val="tx1"/>
-              </a:fontRef>
-            </p:style>
-          </p:cxnSp>
-          <p:cxnSp>
-            <p:nvCxnSpPr>
-              <p:cNvPr id="1047" name="Straight Connector 1046">
-                <a:extLst>
-                  <a:ext uri="{FF2B5EF4-FFF2-40B4-BE49-F238E27FC236}">
-                    <a16:creationId xmlns:a16="http://schemas.microsoft.com/office/drawing/2014/main" id="{90596D14-09C3-6E40-0622-5318C88A6FE1}"/>
-                  </a:ext>
-                </a:extLst>
-              </p:cNvPr>
-              <p:cNvCxnSpPr>
-                <a:cxnSpLocks/>
-                <a:stCxn id="1104" idx="3"/>
-                <a:endCxn id="1098" idx="2"/>
-              </p:cNvCxnSpPr>
-              <p:nvPr/>
-            </p:nvCxnSpPr>
-            <p:spPr>
-              <a:xfrm>
-                <a:off x="1034750" y="2689414"/>
-                <a:ext cx="1070000" cy="198900"/>
-              </a:xfrm>
-              <a:prstGeom prst="line">
-                <a:avLst/>
-              </a:prstGeom>
-            </p:spPr>
-            <p:style>
-              <a:lnRef idx="2">
-                <a:schemeClr val="dk1"/>
-              </a:lnRef>
-              <a:fillRef idx="0">
-                <a:schemeClr val="dk1"/>
-              </a:fillRef>
-              <a:effectRef idx="1">
-                <a:schemeClr val="dk1"/>
-              </a:effectRef>
-              <a:fontRef idx="minor">
-                <a:schemeClr val="tx1"/>
-              </a:fontRef>
-            </p:style>
-          </p:cxnSp>
-          <p:cxnSp>
-            <p:nvCxnSpPr>
-              <p:cNvPr id="1048" name="Straight Connector 1047">
-                <a:extLst>
-                  <a:ext uri="{FF2B5EF4-FFF2-40B4-BE49-F238E27FC236}">
-                    <a16:creationId xmlns:a16="http://schemas.microsoft.com/office/drawing/2014/main" id="{6E0E0BE7-8667-F559-E977-0853FEDF0A58}"/>
-                  </a:ext>
-                </a:extLst>
-              </p:cNvPr>
-              <p:cNvCxnSpPr>
-                <a:cxnSpLocks/>
-                <a:stCxn id="1070" idx="3"/>
-                <a:endCxn id="1098" idx="3"/>
-              </p:cNvCxnSpPr>
-              <p:nvPr/>
-            </p:nvCxnSpPr>
-            <p:spPr>
-              <a:xfrm flipV="1">
-                <a:off x="1591426" y="3120886"/>
-                <a:ext cx="608974" cy="520503"/>
-              </a:xfrm>
-              <a:prstGeom prst="line">
-                <a:avLst/>
-              </a:prstGeom>
-            </p:spPr>
-            <p:style>
-              <a:lnRef idx="2">
-                <a:schemeClr val="dk1"/>
-              </a:lnRef>
-              <a:fillRef idx="0">
-                <a:schemeClr val="dk1"/>
-              </a:fillRef>
-              <a:effectRef idx="1">
-                <a:schemeClr val="dk1"/>
-              </a:effectRef>
-              <a:fontRef idx="minor">
-                <a:schemeClr val="tx1"/>
-              </a:fontRef>
-            </p:style>
-          </p:cxnSp>
-          <p:cxnSp>
-            <p:nvCxnSpPr>
-              <p:cNvPr id="1050" name="Straight Connector 1049">
-                <a:extLst>
-                  <a:ext uri="{FF2B5EF4-FFF2-40B4-BE49-F238E27FC236}">
-                    <a16:creationId xmlns:a16="http://schemas.microsoft.com/office/drawing/2014/main" id="{AFF0C5B2-3B93-D7FB-BF2B-EB57BDC8BFBE}"/>
-                  </a:ext>
-                </a:extLst>
-              </p:cNvPr>
-              <p:cNvCxnSpPr>
-                <a:cxnSpLocks/>
-                <a:stCxn id="1062" idx="1"/>
-                <a:endCxn id="1090" idx="6"/>
-              </p:cNvCxnSpPr>
-              <p:nvPr/>
-            </p:nvCxnSpPr>
-            <p:spPr>
-              <a:xfrm flipH="1" flipV="1">
-                <a:off x="4391765" y="2886123"/>
-                <a:ext cx="727214" cy="268111"/>
-              </a:xfrm>
-              <a:prstGeom prst="line">
-                <a:avLst/>
-              </a:prstGeom>
-            </p:spPr>
-            <p:style>
-              <a:lnRef idx="2">
-                <a:schemeClr val="dk1"/>
-              </a:lnRef>
-              <a:fillRef idx="0">
-                <a:schemeClr val="dk1"/>
-              </a:fillRef>
-              <a:effectRef idx="1">
-                <a:schemeClr val="dk1"/>
-              </a:effectRef>
-              <a:fontRef idx="minor">
-                <a:schemeClr val="tx1"/>
-              </a:fontRef>
-            </p:style>
-          </p:cxnSp>
-          <p:cxnSp>
-            <p:nvCxnSpPr>
-              <p:cNvPr id="1051" name="Straight Connector 1050">
-                <a:extLst>
-                  <a:ext uri="{FF2B5EF4-FFF2-40B4-BE49-F238E27FC236}">
-                    <a16:creationId xmlns:a16="http://schemas.microsoft.com/office/drawing/2014/main" id="{87A9D16E-ADE0-F99C-C2A2-A25EF7A4A172}"/>
-                  </a:ext>
-                </a:extLst>
-              </p:cNvPr>
-              <p:cNvCxnSpPr>
-                <a:cxnSpLocks/>
-                <a:stCxn id="1058" idx="1"/>
-                <a:endCxn id="1090" idx="7"/>
-              </p:cNvCxnSpPr>
-              <p:nvPr/>
-            </p:nvCxnSpPr>
-            <p:spPr>
-              <a:xfrm flipH="1">
-                <a:off x="4296115" y="2028126"/>
-                <a:ext cx="545368" cy="625425"/>
-              </a:xfrm>
-              <a:prstGeom prst="line">
-                <a:avLst/>
-              </a:prstGeom>
-            </p:spPr>
-            <p:style>
-              <a:lnRef idx="2">
-                <a:schemeClr val="dk1"/>
-              </a:lnRef>
-              <a:fillRef idx="0">
-                <a:schemeClr val="dk1"/>
-              </a:fillRef>
-              <a:effectRef idx="1">
-                <a:schemeClr val="dk1"/>
-              </a:effectRef>
-              <a:fontRef idx="minor">
-                <a:schemeClr val="tx1"/>
-              </a:fontRef>
-            </p:style>
-          </p:cxnSp>
-          <p:grpSp>
-            <p:nvGrpSpPr>
-              <p:cNvPr id="1052" name="Group 1051">
-                <a:extLst>
-                  <a:ext uri="{FF2B5EF4-FFF2-40B4-BE49-F238E27FC236}">
-                    <a16:creationId xmlns:a16="http://schemas.microsoft.com/office/drawing/2014/main" id="{1BE9D30A-499A-DE4E-792D-3327EE8911D5}"/>
-                  </a:ext>
-                </a:extLst>
-              </p:cNvPr>
-              <p:cNvGrpSpPr/>
-              <p:nvPr/>
-            </p:nvGrpSpPr>
-            <p:grpSpPr>
-              <a:xfrm>
-                <a:off x="1940096" y="4398944"/>
-                <a:ext cx="653138" cy="657814"/>
-                <a:chOff x="5223901" y="2189808"/>
-                <a:chExt cx="1404730" cy="1404730"/>
-              </a:xfrm>
-            </p:grpSpPr>
-            <p:sp>
-              <p:nvSpPr>
-                <p:cNvPr id="1054" name="Rectangle 1053">
-                  <a:extLst>
-                    <a:ext uri="{FF2B5EF4-FFF2-40B4-BE49-F238E27FC236}">
-                      <a16:creationId xmlns:a16="http://schemas.microsoft.com/office/drawing/2014/main" id="{C57E5780-7FE3-8A56-392C-4BB02F8C4743}"/>
-                    </a:ext>
-                  </a:extLst>
-                </p:cNvPr>
-                <p:cNvSpPr/>
-                <p:nvPr/>
-              </p:nvSpPr>
-              <p:spPr>
-                <a:xfrm>
-                  <a:off x="5223901" y="2189808"/>
-                  <a:ext cx="1404730" cy="1404730"/>
-                </a:xfrm>
-                <a:prstGeom prst="rect">
-                  <a:avLst/>
-                </a:prstGeom>
-                <a:ln w="12700">
-                  <a:solidFill>
-                    <a:schemeClr val="tx1"/>
-                  </a:solidFill>
-                </a:ln>
-              </p:spPr>
-              <p:style>
-                <a:lnRef idx="2">
-                  <a:schemeClr val="accent6"/>
-                </a:lnRef>
-                <a:fillRef idx="1">
-                  <a:schemeClr val="lt1"/>
-                </a:fillRef>
-                <a:effectRef idx="0">
-                  <a:schemeClr val="accent6"/>
-                </a:effectRef>
-                <a:fontRef idx="minor">
-                  <a:schemeClr val="dk1"/>
-                </a:fontRef>
-              </p:style>
-              <p:txBody>
-                <a:bodyPr rtlCol="0" anchor="ctr"/>
-                <a:lstStyle/>
-                <a:p>
-                  <a:pPr algn="ctr"/>
-                  <a:endParaRPr lang="fr-FR"/>
-                </a:p>
-              </p:txBody>
-            </p:sp>
-            <p:grpSp>
-              <p:nvGrpSpPr>
-                <p:cNvPr id="1055" name="Group 1054">
-                  <a:extLst>
-                    <a:ext uri="{FF2B5EF4-FFF2-40B4-BE49-F238E27FC236}">
-                      <a16:creationId xmlns:a16="http://schemas.microsoft.com/office/drawing/2014/main" id="{FFE300B4-93B7-CC10-649C-FC51F78D8690}"/>
-                    </a:ext>
-                  </a:extLst>
-                </p:cNvPr>
-                <p:cNvGrpSpPr/>
-                <p:nvPr/>
-              </p:nvGrpSpPr>
-              <p:grpSpPr>
-                <a:xfrm>
-                  <a:off x="5451276" y="2391808"/>
-                  <a:ext cx="949980" cy="997778"/>
-                  <a:chOff x="4206340" y="524841"/>
-                  <a:chExt cx="949980" cy="997778"/>
-                </a:xfrm>
-              </p:grpSpPr>
-              <p:pic>
-                <p:nvPicPr>
-                  <p:cNvPr id="1056" name="Picture 2" descr="Apple IPhone X Revealed: Photos, Specs, Features, Release, 57% OFF">
-                    <a:extLst>
-                      <a:ext uri="{FF2B5EF4-FFF2-40B4-BE49-F238E27FC236}">
-                        <a16:creationId xmlns:a16="http://schemas.microsoft.com/office/drawing/2014/main" id="{0F090864-FA6D-D2C6-409E-DBBA46C3D7F2}"/>
-                      </a:ext>
-                    </a:extLst>
-                  </p:cNvPr>
-                  <p:cNvPicPr>
-                    <a:picLocks noChangeAspect="1" noChangeArrowheads="1"/>
-                  </p:cNvPicPr>
-                  <p:nvPr/>
-                </p:nvPicPr>
-                <p:blipFill>
-                  <a:blip r:embed="rId2">
-                    <a:extLst>
-                      <a:ext uri="{28A0092B-C50C-407E-A947-70E740481C1C}">
-                        <a14:useLocalDpi xmlns:a14="http://schemas.microsoft.com/office/drawing/2010/main" val="0"/>
-                      </a:ext>
-                    </a:extLst>
-                  </a:blip>
-                  <a:srcRect/>
-                  <a:stretch>
-                    <a:fillRect/>
-                  </a:stretch>
-                </p:blipFill>
-                <p:spPr bwMode="auto">
-                  <a:xfrm>
-                    <a:off x="4206340" y="524841"/>
-                    <a:ext cx="949980" cy="997778"/>
-                  </a:xfrm>
-                  <a:prstGeom prst="rect">
-                    <a:avLst/>
-                  </a:prstGeom>
-                  <a:noFill/>
-                  <a:extLst>
-                    <a:ext uri="{909E8E84-426E-40DD-AFC4-6F175D3DCCD1}">
-                      <a14:hiddenFill xmlns:a14="http://schemas.microsoft.com/office/drawing/2010/main">
-                        <a:solidFill>
-                          <a:srgbClr val="FFFFFF"/>
-                        </a:solidFill>
-                      </a14:hiddenFill>
-                    </a:ext>
-                  </a:extLst>
-                </p:spPr>
-              </p:pic>
-              <p:pic>
-                <p:nvPicPr>
-                  <p:cNvPr id="1057" name="Picture 1056" descr="A white background with black dots&#10;&#10;Description automatically generated">
-                    <a:extLst>
-                      <a:ext uri="{FF2B5EF4-FFF2-40B4-BE49-F238E27FC236}">
-                        <a16:creationId xmlns:a16="http://schemas.microsoft.com/office/drawing/2014/main" id="{C77FEA3B-66BC-9020-8A5F-4208B9B4B5FF}"/>
-                      </a:ext>
-                    </a:extLst>
-                  </p:cNvPr>
-                  <p:cNvPicPr>
-                    <a:picLocks noChangeAspect="1"/>
-                  </p:cNvPicPr>
-                  <p:nvPr/>
-                </p:nvPicPr>
-                <p:blipFill>
-                  <a:blip r:embed="rId3"/>
-                  <a:stretch>
-                    <a:fillRect/>
-                  </a:stretch>
-                </p:blipFill>
-                <p:spPr>
-                  <a:xfrm>
-                    <a:off x="4511596" y="808411"/>
-                    <a:ext cx="292519" cy="314710"/>
-                  </a:xfrm>
-                  <a:prstGeom prst="rect">
-                    <a:avLst/>
-                  </a:prstGeom>
-                </p:spPr>
-              </p:pic>
-            </p:grpSp>
-          </p:grpSp>
-        </p:grpSp>
-        <p:cxnSp>
-          <p:nvCxnSpPr>
-            <p:cNvPr id="1053" name="Straight Connector 1052">
-              <a:extLst>
-                <a:ext uri="{FF2B5EF4-FFF2-40B4-BE49-F238E27FC236}">
-                  <a16:creationId xmlns:a16="http://schemas.microsoft.com/office/drawing/2014/main" id="{C14F5AA5-7E91-9388-5F00-332A4FA42452}"/>
-                </a:ext>
-              </a:extLst>
-            </p:cNvPr>
-            <p:cNvCxnSpPr>
-              <a:cxnSpLocks/>
-              <a:stCxn id="1054" idx="0"/>
-              <a:endCxn id="1092" idx="3"/>
-            </p:cNvCxnSpPr>
-            <p:nvPr/>
-          </p:nvCxnSpPr>
-          <p:spPr>
-            <a:xfrm flipV="1">
-              <a:off x="2266665" y="4020759"/>
-              <a:ext cx="260303" cy="378185"/>
-            </a:xfrm>
-            <a:prstGeom prst="line">
-              <a:avLst/>
-            </a:prstGeom>
-          </p:spPr>
-          <p:style>
-            <a:lnRef idx="2">
-              <a:schemeClr val="dk1"/>
-            </a:lnRef>
-            <a:fillRef idx="0">
-              <a:schemeClr val="dk1"/>
-            </a:fillRef>
-            <a:effectRef idx="1">
-              <a:schemeClr val="dk1"/>
-            </a:effectRef>
-            <a:fontRef idx="minor">
-              <a:schemeClr val="tx1"/>
-            </a:fontRef>
-          </p:style>
-        </p:cxnSp>
-      </p:grpSp>
       <p:pic>
         <p:nvPicPr>
           <p:cNvPr id="1111" name="Picture 4">
@@ -6700,7 +4050,7 @@
           <p:nvPr/>
         </p:nvPicPr>
         <p:blipFill>
-          <a:blip r:embed="rId5">
+          <a:blip r:embed="rId2">
             <a:extLst>
               <a:ext uri="{28A0092B-C50C-407E-A947-70E740481C1C}">
                 <a14:useLocalDpi xmlns:a14="http://schemas.microsoft.com/office/drawing/2010/main" val="0"/>
@@ -6776,20 +4126,19 @@
         </p:nvSpPr>
         <p:spPr>
           <a:xfrm>
-            <a:off x="7147600" y="-431924"/>
+            <a:off x="7136967" y="-49528"/>
             <a:ext cx="12979021" cy="7470787"/>
           </a:xfrm>
           <a:prstGeom prst="rect">
             <a:avLst/>
           </a:prstGeom>
           <a:solidFill>
-            <a:schemeClr val="accent1">
-              <a:lumMod val="60000"/>
-              <a:lumOff val="40000"/>
-            </a:schemeClr>
+            <a:schemeClr val="accent6"/>
           </a:solidFill>
           <a:ln>
-            <a:noFill/>
+            <a:solidFill>
+              <a:schemeClr val="accent6"/>
+            </a:solidFill>
           </a:ln>
         </p:spPr>
         <p:style>
@@ -7270,7 +4619,7 @@
               <a:rPr lang="fr-FR" sz="2400" b="1" dirty="0">
                 <a:latin typeface="Avenir Book" panose="02000503020000020003" pitchFamily="2" charset="0"/>
               </a:rPr>
-              <a:t>Algorithme Glouton</a:t>
+              <a:t>Algorithme ID3 : Apprentissage</a:t>
             </a:r>
           </a:p>
         </p:txBody>
@@ -7471,7 +4820,7 @@
               <a:rPr lang="fr-FR" sz="2400" b="1" dirty="0">
                 <a:latin typeface="Avenir Book" panose="02000503020000020003" pitchFamily="2" charset="0"/>
               </a:rPr>
-              <a:t>Algorithme Génétique</a:t>
+              <a:t>Algorithme ID3 : Prédiction</a:t>
             </a:r>
           </a:p>
         </p:txBody>
@@ -7672,7 +5021,7 @@
               <a:rPr lang="fr-FR" sz="2400" b="1" dirty="0">
                 <a:latin typeface="Avenir Book" panose="02000503020000020003" pitchFamily="2" charset="0"/>
               </a:rPr>
-              <a:t>Approche Naïve</a:t>
+              <a:t>Problème Initial</a:t>
             </a:r>
           </a:p>
         </p:txBody>
@@ -10428,13 +7777,12 @@
             <a:avLst/>
           </a:prstGeom>
           <a:solidFill>
-            <a:schemeClr val="accent1">
-              <a:lumMod val="60000"/>
-              <a:lumOff val="40000"/>
-            </a:schemeClr>
+            <a:schemeClr val="accent6"/>
           </a:solidFill>
           <a:ln>
-            <a:noFill/>
+            <a:solidFill>
+              <a:schemeClr val="accent6"/>
+            </a:solidFill>
           </a:ln>
         </p:spPr>
         <p:style>
@@ -10970,7 +8318,7 @@
               <a:rPr lang="fr-FR" sz="4400" b="1" dirty="0">
                 <a:latin typeface="Avenir Book" panose="02000503020000020003" pitchFamily="2" charset="0"/>
               </a:rPr>
-              <a:t>Approche Naïve</a:t>
+              <a:t>Problème Initial</a:t>
             </a:r>
           </a:p>
         </p:txBody>
@@ -10991,7 +8339,7 @@
         </p:nvSpPr>
         <p:spPr>
           <a:xfrm>
-            <a:off x="767984" y="-1339980"/>
+            <a:off x="767987" y="-1000814"/>
             <a:ext cx="8306901" cy="1060172"/>
           </a:xfrm>
           <a:prstGeom prst="rect">
@@ -11227,7 +8575,7 @@
               <a:rPr lang="fr-FR" sz="2400" b="1" dirty="0">
                 <a:latin typeface="Avenir Book" panose="02000503020000020003" pitchFamily="2" charset="0"/>
               </a:rPr>
-              <a:t>Algorithme des Fourmis</a:t>
+              <a:t>Mon programme</a:t>
             </a:r>
           </a:p>
         </p:txBody>
@@ -11428,7 +8776,7 @@
               <a:rPr lang="fr-FR" sz="2400" b="1" dirty="0">
                 <a:latin typeface="Avenir Book" panose="02000503020000020003" pitchFamily="2" charset="0"/>
               </a:rPr>
-              <a:t>Algorithme Glouton</a:t>
+              <a:t>Algorithme ID3 : Apprentissage</a:t>
             </a:r>
           </a:p>
         </p:txBody>
@@ -11629,7 +8977,7 @@
               <a:rPr lang="fr-FR" sz="2400" b="1" dirty="0">
                 <a:latin typeface="Avenir Book" panose="02000503020000020003" pitchFamily="2" charset="0"/>
               </a:rPr>
-              <a:t>Algorithme Génétique</a:t>
+              <a:t>Algorithme ID3 : Prédiction</a:t>
             </a:r>
           </a:p>
         </p:txBody>
@@ -16262,13 +13610,12 @@
             <a:avLst/>
           </a:prstGeom>
           <a:solidFill>
-            <a:schemeClr val="accent1">
-              <a:lumMod val="60000"/>
-              <a:lumOff val="40000"/>
-            </a:schemeClr>
+            <a:schemeClr val="accent6"/>
           </a:solidFill>
           <a:ln>
-            <a:noFill/>
+            <a:solidFill>
+              <a:schemeClr val="accent6"/>
+            </a:solidFill>
           </a:ln>
         </p:spPr>
         <p:style>
@@ -16312,8 +13659,8 @@
         </p:nvSpPr>
         <p:spPr>
           <a:xfrm>
-            <a:off x="767987" y="720034"/>
-            <a:ext cx="5928648" cy="723052"/>
+            <a:off x="767986" y="970754"/>
+            <a:ext cx="5739139" cy="723052"/>
           </a:xfrm>
           <a:prstGeom prst="rect">
             <a:avLst/>
@@ -16495,7 +13842,7 @@
               <a:rPr lang="fr-FR" sz="4400" b="1" dirty="0">
                 <a:latin typeface="Avenir Book" panose="02000503020000020003" pitchFamily="2" charset="0"/>
               </a:rPr>
-              <a:t>Algorithme Glouton</a:t>
+              <a:t>Algorithme ID3 : Apprentissage</a:t>
             </a:r>
           </a:p>
         </p:txBody>
@@ -16897,7 +14244,7 @@
               <a:rPr lang="fr-FR" sz="2400" b="1" dirty="0">
                 <a:latin typeface="Avenir Book" panose="02000503020000020003" pitchFamily="2" charset="0"/>
               </a:rPr>
-              <a:t>Algorithme Génétique</a:t>
+              <a:t>Algorithme ID3 : Prédiction</a:t>
             </a:r>
           </a:p>
         </p:txBody>
@@ -17098,7 +14445,7 @@
               <a:rPr lang="fr-FR" sz="2400" b="1" dirty="0">
                 <a:latin typeface="Avenir Book" panose="02000503020000020003" pitchFamily="2" charset="0"/>
               </a:rPr>
-              <a:t>Approche Naïve</a:t>
+              <a:t>Problème Initial</a:t>
             </a:r>
           </a:p>
         </p:txBody>
@@ -21945,13 +19292,12 @@
             <a:avLst/>
           </a:prstGeom>
           <a:solidFill>
-            <a:schemeClr val="accent1">
-              <a:lumMod val="60000"/>
-              <a:lumOff val="40000"/>
-            </a:schemeClr>
+            <a:schemeClr val="accent6"/>
           </a:solidFill>
           <a:ln>
-            <a:noFill/>
+            <a:solidFill>
+              <a:schemeClr val="accent5"/>
+            </a:solidFill>
           </a:ln>
         </p:spPr>
         <p:style>
@@ -22376,7 +19722,7 @@
               <a:rPr lang="fr-FR" sz="2400" b="1" dirty="0">
                 <a:latin typeface="Avenir Book" panose="02000503020000020003" pitchFamily="2" charset="0"/>
               </a:rPr>
-              <a:t>Algorithme Glouton</a:t>
+              <a:t>Algorithme ID3 : Apprentissage</a:t>
             </a:r>
           </a:p>
         </p:txBody>
@@ -22397,7 +19743,7 @@
         </p:nvSpPr>
         <p:spPr>
           <a:xfrm>
-            <a:off x="767986" y="720034"/>
+            <a:off x="767985" y="987600"/>
             <a:ext cx="6379613" cy="723052"/>
           </a:xfrm>
           <a:prstGeom prst="rect">
@@ -22580,7 +19926,7 @@
               <a:rPr lang="fr-FR" sz="4400" b="1" dirty="0">
                 <a:latin typeface="Avenir Book" panose="02000503020000020003" pitchFamily="2" charset="0"/>
               </a:rPr>
-              <a:t>Algorithme Génétique</a:t>
+              <a:t>Algorithme ID3 : Prédiction</a:t>
             </a:r>
           </a:p>
         </p:txBody>
@@ -27317,13 +24663,12 @@
             <a:avLst/>
           </a:prstGeom>
           <a:solidFill>
-            <a:schemeClr val="accent1">
-              <a:lumMod val="60000"/>
-              <a:lumOff val="40000"/>
-            </a:schemeClr>
+            <a:schemeClr val="accent6"/>
           </a:solidFill>
           <a:ln>
-            <a:noFill/>
+            <a:solidFill>
+              <a:schemeClr val="accent5"/>
+            </a:solidFill>
           </a:ln>
         </p:spPr>
         <p:style>
@@ -29065,13 +26410,12 @@
             <a:avLst/>
           </a:prstGeom>
           <a:solidFill>
-            <a:schemeClr val="accent1">
-              <a:lumMod val="60000"/>
-              <a:lumOff val="40000"/>
-            </a:schemeClr>
+            <a:schemeClr val="accent6"/>
           </a:solidFill>
           <a:ln>
-            <a:noFill/>
+            <a:solidFill>
+              <a:schemeClr val="accent6"/>
+            </a:solidFill>
           </a:ln>
         </p:spPr>
         <p:style>

</xml_diff>